<commit_message>
Still working on documentation.
</commit_message>
<xml_diff>
--- a/inst/ubinc/templates/report.pptx
+++ b/inst/ubinc/templates/report.pptx
@@ -13,7 +13,7 @@
   <p:sldSz cx="9144000" cy="6858000" type="screen4x3"/>
   <p:notesSz cx="6858000" cy="9144000"/>
   <p:custDataLst>
-    <p:tags r:id="rId5"/>
+    <p:tags r:id="rId4"/>
   </p:custDataLst>
   <p:defaultTextStyle>
     <a:defPPr>
@@ -110,6 +110,22 @@
       </a:defRPr>
     </a:lvl9pPr>
   </p:defaultTextStyle>
+  <p:extLst>
+    <p:ext uri="{EFAFB233-063F-42B5-8137-9DF3F51BA10A}">
+      <p15:sldGuideLst xmlns:p15="http://schemas.microsoft.com/office/powerpoint/2012/main">
+        <p15:guide id="1" orient="horz" pos="2160">
+          <p15:clr>
+            <a:srgbClr val="A4A3A4"/>
+          </p15:clr>
+        </p15:guide>
+        <p15:guide id="2" pos="2880">
+          <p15:clr>
+            <a:srgbClr val="A4A3A4"/>
+          </p15:clr>
+        </p15:guide>
+      </p15:sldGuideLst>
+    </p:ext>
+  </p:extLst>
 </p:presentation>
 </file>
 
@@ -195,7 +211,7 @@
           <a:p>
             <a:fld id="{1B656253-81D4-504C-9F22-C43A5586B7F8}" type="datetimeFigureOut">
               <a:rPr lang="en-US" smtClean="0"/>
-              <a:t>1/28/18</a:t>
+              <a:t>4/7/18</a:t>
             </a:fld>
             <a:endParaRPr lang="en-US"/>
           </a:p>
@@ -361,7 +377,7 @@
           <a:p>
             <a:fld id="{EEA38B4D-A065-A048-981C-DE16882AB0B1}" type="datetimeFigureOut">
               <a:rPr lang="en-US" smtClean="0"/>
-              <a:t>1/28/18</a:t>
+              <a:t>4/7/18</a:t>
             </a:fld>
             <a:endParaRPr lang="en-US"/>
           </a:p>
@@ -632,7 +648,7 @@
 
 <file path=ppt/slideLayouts/slideLayout1.xml><?xml version="1.0" encoding="utf-8"?>
 <p:sldLayout xmlns:a="http://schemas.openxmlformats.org/drawingml/2006/main" xmlns:r="http://schemas.openxmlformats.org/officeDocument/2006/relationships" xmlns:p="http://schemas.openxmlformats.org/presentationml/2006/main" type="title" preserve="1">
-  <p:cSld name="Title Slide">
+  <p:cSld name="title_slide">
     <p:spTree>
       <p:nvGrpSpPr>
         <p:cNvPr id="1" name=""/>
@@ -839,7 +855,7 @@
 
 <file path=ppt/slideLayouts/slideLayout10.xml><?xml version="1.0" encoding="utf-8"?>
 <p:sldLayout xmlns:a="http://schemas.openxmlformats.org/drawingml/2006/main" xmlns:r="http://schemas.openxmlformats.org/officeDocument/2006/relationships" xmlns:p="http://schemas.openxmlformats.org/presentationml/2006/main" preserve="1" userDrawn="1">
-  <p:cSld name="Blank">
+  <p:cSld name="blank">
     <p:spTree>
       <p:nvGrpSpPr>
         <p:cNvPr id="1" name=""/>
@@ -871,7 +887,7 @@
           <a:p>
             <a:fld id="{52BA1850-337E-7747-91FB-64B4051995E4}" type="datetime1">
               <a:rPr lang="en-US" smtClean="0"/>
-              <a:t>1/28/18</a:t>
+              <a:t>4/7/18</a:t>
             </a:fld>
             <a:endParaRPr lang="en-GB"/>
           </a:p>
@@ -934,7 +950,7 @@
 
 <file path=ppt/slideLayouts/slideLayout2.xml><?xml version="1.0" encoding="utf-8"?>
 <p:sldLayout xmlns:a="http://schemas.openxmlformats.org/drawingml/2006/main" xmlns:r="http://schemas.openxmlformats.org/officeDocument/2006/relationships" xmlns:p="http://schemas.openxmlformats.org/presentationml/2006/main" preserve="1" userDrawn="1">
-  <p:cSld name="Title and Content List">
+  <p:cSld name="content_list">
     <p:spTree>
       <p:nvGrpSpPr>
         <p:cNvPr id="1" name=""/>
@@ -1083,7 +1099,7 @@
           <a:p>
             <a:fld id="{BB662456-9DF9-7F42-9863-03F75BEC0447}" type="datetime1">
               <a:rPr lang="en-US" smtClean="0"/>
-              <a:t>1/28/18</a:t>
+              <a:t>4/7/18</a:t>
             </a:fld>
             <a:endParaRPr lang="en-GB"/>
           </a:p>
@@ -1255,7 +1271,7 @@
 
 <file path=ppt/slideLayouts/slideLayout3.xml><?xml version="1.0" encoding="utf-8"?>
 <p:sldLayout xmlns:a="http://schemas.openxmlformats.org/drawingml/2006/main" xmlns:r="http://schemas.openxmlformats.org/officeDocument/2006/relationships" xmlns:p="http://schemas.openxmlformats.org/presentationml/2006/main" preserve="1" userDrawn="1">
-  <p:cSld name="Title and Content Text">
+  <p:cSld name="content_text">
     <p:spTree>
       <p:nvGrpSpPr>
         <p:cNvPr id="1" name=""/>
@@ -1430,7 +1446,7 @@
           <a:p>
             <a:fld id="{AA0DAA0C-97E8-DA4A-9975-EC4E464C2F40}" type="datetime1">
               <a:rPr lang="en-US" smtClean="0"/>
-              <a:t>1/28/18</a:t>
+              <a:t>4/7/18</a:t>
             </a:fld>
             <a:endParaRPr lang="en-GB"/>
           </a:p>
@@ -1602,7 +1618,7 @@
 
 <file path=ppt/slideLayouts/slideLayout4.xml><?xml version="1.0" encoding="utf-8"?>
 <p:sldLayout xmlns:a="http://schemas.openxmlformats.org/drawingml/2006/main" xmlns:r="http://schemas.openxmlformats.org/officeDocument/2006/relationships" xmlns:p="http://schemas.openxmlformats.org/presentationml/2006/main" type="secHead" preserve="1">
-  <p:cSld name="Section Header">
+  <p:cSld name="section_slide">
     <p:spTree>
       <p:nvGrpSpPr>
         <p:cNvPr id="1" name=""/>
@@ -1835,7 +1851,7 @@
 
 <file path=ppt/slideLayouts/slideLayout5.xml><?xml version="1.0" encoding="utf-8"?>
 <p:sldLayout xmlns:a="http://schemas.openxmlformats.org/drawingml/2006/main" xmlns:r="http://schemas.openxmlformats.org/officeDocument/2006/relationships" xmlns:p="http://schemas.openxmlformats.org/presentationml/2006/main" preserve="1" userDrawn="1">
-  <p:cSld name="Two Content Header List">
+  <p:cSld name="two_content_header_list">
     <p:spTree>
       <p:nvGrpSpPr>
         <p:cNvPr id="1" name=""/>
@@ -2131,7 +2147,7 @@
           <a:p>
             <a:fld id="{04A76F9C-33B6-4248-95F4-E755A51BE64F}" type="datetime1">
               <a:rPr lang="en-US" smtClean="0"/>
-              <a:t>1/28/18</a:t>
+              <a:t>4/7/18</a:t>
             </a:fld>
             <a:endParaRPr lang="en-GB"/>
           </a:p>
@@ -2404,7 +2420,7 @@
 
 <file path=ppt/slideLayouts/slideLayout6.xml><?xml version="1.0" encoding="utf-8"?>
 <p:sldLayout xmlns:a="http://schemas.openxmlformats.org/drawingml/2006/main" xmlns:r="http://schemas.openxmlformats.org/officeDocument/2006/relationships" xmlns:p="http://schemas.openxmlformats.org/presentationml/2006/main" preserve="1" userDrawn="1">
-  <p:cSld name="Two Content Header Text">
+  <p:cSld name="two_content_header_text">
     <p:spTree>
       <p:nvGrpSpPr>
         <p:cNvPr id="1" name=""/>
@@ -2710,7 +2726,7 @@
           <a:p>
             <a:fld id="{7BA53915-059E-FD4B-A198-BD5AD9F97206}" type="datetime1">
               <a:rPr lang="en-US" smtClean="0"/>
-              <a:t>1/28/18</a:t>
+              <a:t>4/7/18</a:t>
             </a:fld>
             <a:endParaRPr lang="en-GB"/>
           </a:p>
@@ -2983,7 +2999,7 @@
 
 <file path=ppt/slideLayouts/slideLayout7.xml><?xml version="1.0" encoding="utf-8"?>
 <p:sldLayout xmlns:a="http://schemas.openxmlformats.org/drawingml/2006/main" xmlns:r="http://schemas.openxmlformats.org/officeDocument/2006/relationships" xmlns:p="http://schemas.openxmlformats.org/presentationml/2006/main" preserve="1" userDrawn="1">
-  <p:cSld name="Two Content List">
+  <p:cSld name="two_content_list">
     <p:spTree>
       <p:nvGrpSpPr>
         <p:cNvPr id="1" name=""/>
@@ -3279,7 +3295,7 @@
           <a:p>
             <a:fld id="{F7C6CE28-510F-5240-BB2D-5CAA84033ED0}" type="datetime1">
               <a:rPr lang="en-US" smtClean="0"/>
-              <a:t>1/28/18</a:t>
+              <a:t>4/7/18</a:t>
             </a:fld>
             <a:endParaRPr lang="en-GB"/>
           </a:p>
@@ -3422,7 +3438,7 @@
 
 <file path=ppt/slideLayouts/slideLayout8.xml><?xml version="1.0" encoding="utf-8"?>
 <p:sldLayout xmlns:a="http://schemas.openxmlformats.org/drawingml/2006/main" xmlns:r="http://schemas.openxmlformats.org/officeDocument/2006/relationships" xmlns:p="http://schemas.openxmlformats.org/presentationml/2006/main" preserve="1" userDrawn="1">
-  <p:cSld name="Two Content Text">
+  <p:cSld name="two_content_text">
     <p:spTree>
       <p:nvGrpSpPr>
         <p:cNvPr id="1" name=""/>
@@ -3728,7 +3744,7 @@
           <a:p>
             <a:fld id="{DC8473B6-9DB1-6841-865B-A1275004FC4D}" type="datetime1">
               <a:rPr lang="en-US" smtClean="0"/>
-              <a:t>1/28/18</a:t>
+              <a:t>4/7/18</a:t>
             </a:fld>
             <a:endParaRPr lang="en-GB"/>
           </a:p>
@@ -3871,7 +3887,7 @@
 
 <file path=ppt/slideLayouts/slideLayout9.xml><?xml version="1.0" encoding="utf-8"?>
 <p:sldLayout xmlns:a="http://schemas.openxmlformats.org/drawingml/2006/main" xmlns:r="http://schemas.openxmlformats.org/officeDocument/2006/relationships" xmlns:p="http://schemas.openxmlformats.org/presentationml/2006/main" preserve="1" userDrawn="1">
-  <p:cSld name="Title Only">
+  <p:cSld name="title_only">
     <p:spTree>
       <p:nvGrpSpPr>
         <p:cNvPr id="1" name=""/>
@@ -3963,7 +3979,7 @@
           <a:p>
             <a:fld id="{D871C1FE-9025-5C49-BA5C-C24D6151D8FF}" type="datetime1">
               <a:rPr lang="en-US" smtClean="0"/>
-              <a:t>1/28/18</a:t>
+              <a:t>4/7/18</a:t>
             </a:fld>
             <a:endParaRPr lang="en-GB"/>
           </a:p>
@@ -4205,7 +4221,7 @@
           <a:p>
             <a:fld id="{13B1BC43-4B43-954F-8BAE-86993A84B7B7}" type="datetime1">
               <a:rPr lang="en-US" smtClean="0"/>
-              <a:t>1/28/18</a:t>
+              <a:t>4/7/18</a:t>
             </a:fld>
             <a:endParaRPr lang="en-GB"/>
           </a:p>

</xml_diff>

<commit_message>
Adding deployment vignette and minor changes
</commit_message>
<xml_diff>
--- a/inst/ubinc/templates/report.pptx
+++ b/inst/ubinc/templates/report.pptx
@@ -211,7 +211,7 @@
           <a:p>
             <a:fld id="{1B656253-81D4-504C-9F22-C43A5586B7F8}" type="datetimeFigureOut">
               <a:rPr lang="en-US" smtClean="0"/>
-              <a:t>4/7/18</a:t>
+              <a:t>4/18/18</a:t>
             </a:fld>
             <a:endParaRPr lang="en-US"/>
           </a:p>
@@ -377,7 +377,7 @@
           <a:p>
             <a:fld id="{EEA38B4D-A065-A048-981C-DE16882AB0B1}" type="datetimeFigureOut">
               <a:rPr lang="en-US" smtClean="0"/>
-              <a:t>4/7/18</a:t>
+              <a:t>4/18/18</a:t>
             </a:fld>
             <a:endParaRPr lang="en-US"/>
           </a:p>
@@ -887,7 +887,7 @@
           <a:p>
             <a:fld id="{52BA1850-337E-7747-91FB-64B4051995E4}" type="datetime1">
               <a:rPr lang="en-US" smtClean="0"/>
-              <a:t>4/7/18</a:t>
+              <a:t>4/18/18</a:t>
             </a:fld>
             <a:endParaRPr lang="en-GB"/>
           </a:p>
@@ -1040,7 +1040,12 @@
             <p:ph idx="1"/>
           </p:nvPr>
         </p:nvSpPr>
-        <p:spPr/>
+        <p:spPr>
+          <a:xfrm>
+            <a:off x="251520" y="1600200"/>
+            <a:ext cx="8686800" cy="4572000"/>
+          </a:xfrm>
+        </p:spPr>
         <p:txBody>
           <a:bodyPr/>
           <a:lstStyle/>
@@ -1099,7 +1104,7 @@
           <a:p>
             <a:fld id="{BB662456-9DF9-7F42-9863-03F75BEC0447}" type="datetime1">
               <a:rPr lang="en-US" smtClean="0"/>
-              <a:t>4/7/18</a:t>
+              <a:t>4/18/18</a:t>
             </a:fld>
             <a:endParaRPr lang="en-GB"/>
           </a:p>
@@ -1364,7 +1369,7 @@
         <p:spPr>
           <a:xfrm>
             <a:off x="251520" y="1600200"/>
-            <a:ext cx="8640960" cy="4637112"/>
+            <a:ext cx="8686800" cy="4572000"/>
           </a:xfrm>
         </p:spPr>
         <p:txBody>
@@ -1446,7 +1451,7 @@
           <a:p>
             <a:fld id="{AA0DAA0C-97E8-DA4A-9975-EC4E464C2F40}" type="datetime1">
               <a:rPr lang="en-US" smtClean="0"/>
-              <a:t>4/7/18</a:t>
+              <a:t>4/18/18</a:t>
             </a:fld>
             <a:endParaRPr lang="en-GB"/>
           </a:p>
@@ -2147,7 +2152,7 @@
           <a:p>
             <a:fld id="{04A76F9C-33B6-4248-95F4-E755A51BE64F}" type="datetime1">
               <a:rPr lang="en-US" smtClean="0"/>
-              <a:t>4/7/18</a:t>
+              <a:t>4/18/18</a:t>
             </a:fld>
             <a:endParaRPr lang="en-GB"/>
           </a:p>
@@ -2726,7 +2731,7 @@
           <a:p>
             <a:fld id="{7BA53915-059E-FD4B-A198-BD5AD9F97206}" type="datetime1">
               <a:rPr lang="en-US" smtClean="0"/>
-              <a:t>4/7/18</a:t>
+              <a:t>4/18/18</a:t>
             </a:fld>
             <a:endParaRPr lang="en-GB"/>
           </a:p>
@@ -3121,7 +3126,7 @@
         <p:spPr>
           <a:xfrm>
             <a:off x="251520" y="1600200"/>
-            <a:ext cx="4244280" cy="4637112"/>
+            <a:ext cx="4261104" cy="4572000"/>
           </a:xfrm>
         </p:spPr>
         <p:txBody>
@@ -3206,7 +3211,7 @@
         <p:spPr>
           <a:xfrm>
             <a:off x="4648200" y="1600200"/>
-            <a:ext cx="4244280" cy="4637112"/>
+            <a:ext cx="4251960" cy="4572000"/>
           </a:xfrm>
         </p:spPr>
         <p:txBody>
@@ -3295,7 +3300,7 @@
           <a:p>
             <a:fld id="{F7C6CE28-510F-5240-BB2D-5CAA84033ED0}" type="datetime1">
               <a:rPr lang="en-US" smtClean="0"/>
-              <a:t>4/7/18</a:t>
+              <a:t>4/18/18</a:t>
             </a:fld>
             <a:endParaRPr lang="en-GB"/>
           </a:p>
@@ -3744,7 +3749,7 @@
           <a:p>
             <a:fld id="{DC8473B6-9DB1-6841-865B-A1275004FC4D}" type="datetime1">
               <a:rPr lang="en-US" smtClean="0"/>
-              <a:t>4/7/18</a:t>
+              <a:t>4/18/18</a:t>
             </a:fld>
             <a:endParaRPr lang="en-GB"/>
           </a:p>
@@ -3979,7 +3984,7 @@
           <a:p>
             <a:fld id="{D871C1FE-9025-5C49-BA5C-C24D6151D8FF}" type="datetime1">
               <a:rPr lang="en-US" smtClean="0"/>
-              <a:t>4/7/18</a:t>
+              <a:t>4/18/18</a:t>
             </a:fld>
             <a:endParaRPr lang="en-GB"/>
           </a:p>
@@ -4221,7 +4226,7 @@
           <a:p>
             <a:fld id="{13B1BC43-4B43-954F-8BAE-86993A84B7B7}" type="datetime1">
               <a:rPr lang="en-US" smtClean="0"/>
-              <a:t>4/7/18</a:t>
+              <a:t>4/18/18</a:t>
             </a:fld>
             <a:endParaRPr lang="en-GB"/>
           </a:p>

</xml_diff>

<commit_message>
examples:   fixed Absorption for one and two compartment models
  system for glp tox study design

R Workflow:
system_plot_cohorts
  Deprecated prefix input, workarounds in place and messages should inform
  users

  fixed device specification in ggsave calls

templates
  save report command fixed
</commit_message>
<xml_diff>
--- a/inst/ubinc/templates/report.pptx
+++ b/inst/ubinc/templates/report.pptx
@@ -211,7 +211,7 @@
           <a:p>
             <a:fld id="{1B656253-81D4-504C-9F22-C43A5586B7F8}" type="datetimeFigureOut">
               <a:rPr lang="en-US" smtClean="0"/>
-              <a:t>4/18/18</a:t>
+              <a:t>1/25/19</a:t>
             </a:fld>
             <a:endParaRPr lang="en-US"/>
           </a:p>
@@ -377,7 +377,7 @@
           <a:p>
             <a:fld id="{EEA38B4D-A065-A048-981C-DE16882AB0B1}" type="datetimeFigureOut">
               <a:rPr lang="en-US" smtClean="0"/>
-              <a:t>4/18/18</a:t>
+              <a:t>1/25/19</a:t>
             </a:fld>
             <a:endParaRPr lang="en-US"/>
           </a:p>
@@ -441,38 +441,37 @@
           <a:p>
             <a:pPr lvl="0"/>
             <a:r>
-              <a:rPr lang="en-US" smtClean="0"/>
+              <a:rPr lang="en-US"/>
               <a:t>Click to edit Master text styles</a:t>
             </a:r>
           </a:p>
           <a:p>
             <a:pPr lvl="1"/>
             <a:r>
-              <a:rPr lang="en-US" smtClean="0"/>
+              <a:rPr lang="en-US"/>
               <a:t>Second level</a:t>
             </a:r>
           </a:p>
           <a:p>
             <a:pPr lvl="2"/>
             <a:r>
-              <a:rPr lang="en-US" smtClean="0"/>
+              <a:rPr lang="en-US"/>
               <a:t>Third level</a:t>
             </a:r>
           </a:p>
           <a:p>
             <a:pPr lvl="3"/>
             <a:r>
-              <a:rPr lang="en-US" smtClean="0"/>
+              <a:rPr lang="en-US"/>
               <a:t>Fourth level</a:t>
             </a:r>
           </a:p>
           <a:p>
             <a:pPr lvl="4"/>
             <a:r>
-              <a:rPr lang="en-US" smtClean="0"/>
+              <a:rPr lang="en-US"/>
               <a:t>Fifth level</a:t>
             </a:r>
-            <a:endParaRPr lang="en-US"/>
           </a:p>
         </p:txBody>
       </p:sp>
@@ -714,7 +713,7 @@
           <a:lstStyle/>
           <a:p>
             <a:r>
-              <a:rPr lang="en-US" dirty="0" smtClean="0"/>
+              <a:rPr lang="en-US" dirty="0"/>
               <a:t>Click to edit Master title style</a:t>
             </a:r>
             <a:endParaRPr lang="en-GB" dirty="0"/>
@@ -833,7 +832,7 @@
           </a:lstStyle>
           <a:p>
             <a:r>
-              <a:rPr lang="en-US" dirty="0" smtClean="0"/>
+              <a:rPr lang="en-US" dirty="0"/>
               <a:t>Click to edit Master subtitle style</a:t>
             </a:r>
             <a:endParaRPr lang="en-GB" dirty="0"/>
@@ -880,14 +879,19 @@
             <p:ph type="dt" sz="half" idx="10"/>
           </p:nvPr>
         </p:nvSpPr>
-        <p:spPr/>
+        <p:spPr>
+          <a:xfrm>
+            <a:off x="251520" y="6356350"/>
+            <a:ext cx="720080" cy="365125"/>
+          </a:xfrm>
+        </p:spPr>
         <p:txBody>
           <a:bodyPr/>
           <a:lstStyle/>
           <a:p>
             <a:fld id="{52BA1850-337E-7747-91FB-64B4051995E4}" type="datetime1">
               <a:rPr lang="en-US" smtClean="0"/>
-              <a:t>4/18/18</a:t>
+              <a:t>1/25/19</a:t>
             </a:fld>
             <a:endParaRPr lang="en-GB"/>
           </a:p>
@@ -903,12 +907,21 @@
             <p:ph type="ftr" sz="quarter" idx="11"/>
           </p:nvPr>
         </p:nvSpPr>
-        <p:spPr/>
+        <p:spPr>
+          <a:xfrm>
+            <a:off x="1043608" y="6356350"/>
+            <a:ext cx="7056784" cy="365125"/>
+          </a:xfrm>
+        </p:spPr>
         <p:txBody>
           <a:bodyPr/>
-          <a:lstStyle/>
-          <a:p>
-            <a:endParaRPr lang="en-GB"/>
+          <a:lstStyle>
+            <a:lvl1pPr algn="l">
+              <a:defRPr/>
+            </a:lvl1pPr>
+          </a:lstStyle>
+          <a:p>
+            <a:endParaRPr lang="en-GB" dirty="0"/>
           </a:p>
         </p:txBody>
       </p:sp>
@@ -922,7 +935,12 @@
             <p:ph type="sldNum" sz="quarter" idx="12"/>
           </p:nvPr>
         </p:nvSpPr>
-        <p:spPr/>
+        <p:spPr>
+          <a:xfrm>
+            <a:off x="8172400" y="6356350"/>
+            <a:ext cx="720080" cy="365125"/>
+          </a:xfrm>
+        </p:spPr>
         <p:txBody>
           <a:bodyPr/>
           <a:lstStyle/>
@@ -1023,7 +1041,7 @@
           </a:lstStyle>
           <a:p>
             <a:r>
-              <a:rPr lang="en-US" dirty="0" smtClean="0"/>
+              <a:rPr lang="en-US" dirty="0"/>
               <a:t>Click to edit Master title style</a:t>
             </a:r>
             <a:endParaRPr lang="en-GB" dirty="0"/>
@@ -1052,35 +1070,35 @@
           <a:p>
             <a:pPr lvl="0"/>
             <a:r>
-              <a:rPr lang="en-US" dirty="0" smtClean="0"/>
+              <a:rPr lang="en-US" dirty="0"/>
               <a:t>Click to edit Master text styles</a:t>
             </a:r>
           </a:p>
           <a:p>
             <a:pPr lvl="1"/>
             <a:r>
-              <a:rPr lang="en-US" dirty="0" smtClean="0"/>
+              <a:rPr lang="en-US" dirty="0"/>
               <a:t>Second level</a:t>
             </a:r>
           </a:p>
           <a:p>
             <a:pPr lvl="2"/>
             <a:r>
-              <a:rPr lang="en-US" dirty="0" smtClean="0"/>
+              <a:rPr lang="en-US" dirty="0"/>
               <a:t>Third level</a:t>
             </a:r>
           </a:p>
           <a:p>
             <a:pPr lvl="3"/>
             <a:r>
-              <a:rPr lang="en-US" dirty="0" smtClean="0"/>
+              <a:rPr lang="en-US" dirty="0"/>
               <a:t>Fourth level</a:t>
             </a:r>
           </a:p>
           <a:p>
             <a:pPr lvl="4"/>
             <a:r>
-              <a:rPr lang="en-US" dirty="0" smtClean="0"/>
+              <a:rPr lang="en-US" dirty="0"/>
               <a:t>Fifth level</a:t>
             </a:r>
             <a:endParaRPr lang="en-GB" dirty="0"/>
@@ -1097,14 +1115,19 @@
             <p:ph type="dt" sz="half" idx="10"/>
           </p:nvPr>
         </p:nvSpPr>
-        <p:spPr/>
+        <p:spPr>
+          <a:xfrm>
+            <a:off x="251520" y="6356350"/>
+            <a:ext cx="720080" cy="365125"/>
+          </a:xfrm>
+        </p:spPr>
         <p:txBody>
           <a:bodyPr/>
           <a:lstStyle/>
           <a:p>
             <a:fld id="{BB662456-9DF9-7F42-9863-03F75BEC0447}" type="datetime1">
               <a:rPr lang="en-US" smtClean="0"/>
-              <a:t>4/18/18</a:t>
+              <a:t>1/25/19</a:t>
             </a:fld>
             <a:endParaRPr lang="en-GB"/>
           </a:p>
@@ -1120,12 +1143,21 @@
             <p:ph type="ftr" sz="quarter" idx="11"/>
           </p:nvPr>
         </p:nvSpPr>
-        <p:spPr/>
+        <p:spPr>
+          <a:xfrm>
+            <a:off x="1043608" y="6356350"/>
+            <a:ext cx="7056784" cy="365125"/>
+          </a:xfrm>
+        </p:spPr>
         <p:txBody>
           <a:bodyPr/>
-          <a:lstStyle/>
-          <a:p>
-            <a:endParaRPr lang="en-GB"/>
+          <a:lstStyle>
+            <a:lvl1pPr algn="l">
+              <a:defRPr/>
+            </a:lvl1pPr>
+          </a:lstStyle>
+          <a:p>
+            <a:endParaRPr lang="en-GB" dirty="0"/>
           </a:p>
         </p:txBody>
       </p:sp>
@@ -1139,7 +1171,12 @@
             <p:ph type="sldNum" sz="quarter" idx="12"/>
           </p:nvPr>
         </p:nvSpPr>
-        <p:spPr/>
+        <p:spPr>
+          <a:xfrm>
+            <a:off x="8172400" y="6356350"/>
+            <a:ext cx="720080" cy="365125"/>
+          </a:xfrm>
+        </p:spPr>
         <p:txBody>
           <a:bodyPr/>
           <a:lstStyle/>
@@ -1226,38 +1263,37 @@
           <a:p>
             <a:pPr lvl="0"/>
             <a:r>
-              <a:rPr lang="en-US" dirty="0" smtClean="0"/>
+              <a:rPr lang="en-US" dirty="0"/>
               <a:t>Click to edit Master text styles</a:t>
             </a:r>
           </a:p>
           <a:p>
             <a:pPr lvl="1"/>
             <a:r>
-              <a:rPr lang="en-US" dirty="0" smtClean="0"/>
+              <a:rPr lang="en-US" dirty="0"/>
               <a:t>Second level</a:t>
             </a:r>
           </a:p>
           <a:p>
             <a:pPr lvl="2"/>
             <a:r>
-              <a:rPr lang="en-US" dirty="0" smtClean="0"/>
+              <a:rPr lang="en-US" dirty="0"/>
               <a:t>Third level</a:t>
             </a:r>
           </a:p>
           <a:p>
             <a:pPr lvl="3"/>
             <a:r>
-              <a:rPr lang="en-US" dirty="0" smtClean="0"/>
+              <a:rPr lang="en-US" dirty="0"/>
               <a:t>Fourth level</a:t>
             </a:r>
           </a:p>
           <a:p>
             <a:pPr lvl="4"/>
             <a:r>
-              <a:rPr lang="en-US" dirty="0" smtClean="0"/>
+              <a:rPr lang="en-US" dirty="0"/>
               <a:t>Fifth level</a:t>
             </a:r>
-            <a:endParaRPr lang="en-US" dirty="0"/>
           </a:p>
         </p:txBody>
       </p:sp>
@@ -1349,7 +1385,7 @@
           </a:lstStyle>
           <a:p>
             <a:r>
-              <a:rPr lang="en-US" dirty="0" smtClean="0"/>
+              <a:rPr lang="en-US" dirty="0"/>
               <a:t>Click to edit Master title style</a:t>
             </a:r>
             <a:endParaRPr lang="en-GB" dirty="0"/>
@@ -1399,35 +1435,35 @@
           <a:p>
             <a:pPr lvl="0"/>
             <a:r>
-              <a:rPr lang="en-US" dirty="0" smtClean="0"/>
+              <a:rPr lang="en-US" dirty="0"/>
               <a:t>Click to edit Master text styles</a:t>
             </a:r>
           </a:p>
           <a:p>
             <a:pPr lvl="1"/>
             <a:r>
-              <a:rPr lang="en-US" dirty="0" smtClean="0"/>
+              <a:rPr lang="en-US" dirty="0"/>
               <a:t>Second level</a:t>
             </a:r>
           </a:p>
           <a:p>
             <a:pPr lvl="2"/>
             <a:r>
-              <a:rPr lang="en-US" dirty="0" smtClean="0"/>
+              <a:rPr lang="en-US" dirty="0"/>
               <a:t>Third level</a:t>
             </a:r>
           </a:p>
           <a:p>
             <a:pPr lvl="3"/>
             <a:r>
-              <a:rPr lang="en-US" dirty="0" smtClean="0"/>
+              <a:rPr lang="en-US" dirty="0"/>
               <a:t>Fourth level</a:t>
             </a:r>
           </a:p>
           <a:p>
             <a:pPr lvl="4"/>
             <a:r>
-              <a:rPr lang="en-US" dirty="0" smtClean="0"/>
+              <a:rPr lang="en-US" dirty="0"/>
               <a:t>Fifth level</a:t>
             </a:r>
             <a:endParaRPr lang="en-GB" dirty="0"/>
@@ -1444,14 +1480,19 @@
             <p:ph type="dt" sz="half" idx="10"/>
           </p:nvPr>
         </p:nvSpPr>
-        <p:spPr/>
+        <p:spPr>
+          <a:xfrm>
+            <a:off x="251520" y="6356350"/>
+            <a:ext cx="720080" cy="365125"/>
+          </a:xfrm>
+        </p:spPr>
         <p:txBody>
           <a:bodyPr/>
           <a:lstStyle/>
           <a:p>
             <a:fld id="{AA0DAA0C-97E8-DA4A-9975-EC4E464C2F40}" type="datetime1">
               <a:rPr lang="en-US" smtClean="0"/>
-              <a:t>4/18/18</a:t>
+              <a:t>1/25/19</a:t>
             </a:fld>
             <a:endParaRPr lang="en-GB"/>
           </a:p>
@@ -1467,12 +1508,21 @@
             <p:ph type="ftr" sz="quarter" idx="11"/>
           </p:nvPr>
         </p:nvSpPr>
-        <p:spPr/>
+        <p:spPr>
+          <a:xfrm>
+            <a:off x="1043608" y="6356350"/>
+            <a:ext cx="7056784" cy="365125"/>
+          </a:xfrm>
+        </p:spPr>
         <p:txBody>
           <a:bodyPr/>
-          <a:lstStyle/>
-          <a:p>
-            <a:endParaRPr lang="en-GB"/>
+          <a:lstStyle>
+            <a:lvl1pPr algn="l">
+              <a:defRPr/>
+            </a:lvl1pPr>
+          </a:lstStyle>
+          <a:p>
+            <a:endParaRPr lang="en-GB" dirty="0"/>
           </a:p>
         </p:txBody>
       </p:sp>
@@ -1486,7 +1536,12 @@
             <p:ph type="sldNum" sz="quarter" idx="12"/>
           </p:nvPr>
         </p:nvSpPr>
-        <p:spPr/>
+        <p:spPr>
+          <a:xfrm>
+            <a:off x="8172400" y="6356350"/>
+            <a:ext cx="720080" cy="365125"/>
+          </a:xfrm>
+        </p:spPr>
         <p:txBody>
           <a:bodyPr/>
           <a:lstStyle/>
@@ -1573,38 +1628,37 @@
           <a:p>
             <a:pPr lvl="0"/>
             <a:r>
-              <a:rPr lang="en-US" dirty="0" smtClean="0"/>
+              <a:rPr lang="en-US" dirty="0"/>
               <a:t>Click to edit Master text styles</a:t>
             </a:r>
           </a:p>
           <a:p>
             <a:pPr lvl="1"/>
             <a:r>
-              <a:rPr lang="en-US" dirty="0" smtClean="0"/>
+              <a:rPr lang="en-US" dirty="0"/>
               <a:t>Second level</a:t>
             </a:r>
           </a:p>
           <a:p>
             <a:pPr lvl="2"/>
             <a:r>
-              <a:rPr lang="en-US" dirty="0" smtClean="0"/>
+              <a:rPr lang="en-US" dirty="0"/>
               <a:t>Third level</a:t>
             </a:r>
           </a:p>
           <a:p>
             <a:pPr lvl="3"/>
             <a:r>
-              <a:rPr lang="en-US" dirty="0" smtClean="0"/>
+              <a:rPr lang="en-US" dirty="0"/>
               <a:t>Fourth level</a:t>
             </a:r>
           </a:p>
           <a:p>
             <a:pPr lvl="4"/>
             <a:r>
-              <a:rPr lang="en-US" dirty="0" smtClean="0"/>
+              <a:rPr lang="en-US" dirty="0"/>
               <a:t>Fifth level</a:t>
             </a:r>
-            <a:endParaRPr lang="en-US" dirty="0"/>
           </a:p>
         </p:txBody>
       </p:sp>
@@ -1663,7 +1717,7 @@
           </a:lstStyle>
           <a:p>
             <a:r>
-              <a:rPr lang="en-US" smtClean="0"/>
+              <a:rPr lang="en-US"/>
               <a:t>Click to edit Master title style</a:t>
             </a:r>
             <a:endParaRPr lang="en-GB"/>
@@ -1783,7 +1837,7 @@
           <a:p>
             <a:pPr lvl="0"/>
             <a:r>
-              <a:rPr lang="en-US" dirty="0" smtClean="0"/>
+              <a:rPr lang="en-US" dirty="0"/>
               <a:t>Click to edit Master text styles</a:t>
             </a:r>
           </a:p>
@@ -1958,7 +2012,7 @@
           </a:lstStyle>
           <a:p>
             <a:r>
-              <a:rPr lang="en-US" dirty="0" smtClean="0"/>
+              <a:rPr lang="en-US" dirty="0"/>
               <a:t>Click to edit Master title style</a:t>
             </a:r>
             <a:endParaRPr lang="en-GB" dirty="0"/>
@@ -2015,35 +2069,35 @@
           <a:p>
             <a:pPr lvl="0"/>
             <a:r>
-              <a:rPr lang="en-US" smtClean="0"/>
+              <a:rPr lang="en-US"/>
               <a:t>Click to edit Master text styles</a:t>
             </a:r>
           </a:p>
           <a:p>
             <a:pPr lvl="1"/>
             <a:r>
-              <a:rPr lang="en-US" smtClean="0"/>
+              <a:rPr lang="en-US"/>
               <a:t>Second level</a:t>
             </a:r>
           </a:p>
           <a:p>
             <a:pPr lvl="2"/>
             <a:r>
-              <a:rPr lang="en-US" smtClean="0"/>
+              <a:rPr lang="en-US"/>
               <a:t>Third level</a:t>
             </a:r>
           </a:p>
           <a:p>
             <a:pPr lvl="3"/>
             <a:r>
-              <a:rPr lang="en-US" smtClean="0"/>
+              <a:rPr lang="en-US"/>
               <a:t>Fourth level</a:t>
             </a:r>
           </a:p>
           <a:p>
             <a:pPr lvl="4"/>
             <a:r>
-              <a:rPr lang="en-US" smtClean="0"/>
+              <a:rPr lang="en-US"/>
               <a:t>Fifth level</a:t>
             </a:r>
             <a:endParaRPr lang="en-GB"/>
@@ -2100,35 +2154,35 @@
           <a:p>
             <a:pPr lvl="0"/>
             <a:r>
-              <a:rPr lang="en-US" dirty="0" smtClean="0"/>
+              <a:rPr lang="en-US" dirty="0"/>
               <a:t>Click to edit Master text styles</a:t>
             </a:r>
           </a:p>
           <a:p>
             <a:pPr lvl="1"/>
             <a:r>
-              <a:rPr lang="en-US" dirty="0" smtClean="0"/>
+              <a:rPr lang="en-US" dirty="0"/>
               <a:t>Second level</a:t>
             </a:r>
           </a:p>
           <a:p>
             <a:pPr lvl="2"/>
             <a:r>
-              <a:rPr lang="en-US" dirty="0" smtClean="0"/>
+              <a:rPr lang="en-US" dirty="0"/>
               <a:t>Third level</a:t>
             </a:r>
           </a:p>
           <a:p>
             <a:pPr lvl="3"/>
             <a:r>
-              <a:rPr lang="en-US" dirty="0" smtClean="0"/>
+              <a:rPr lang="en-US" dirty="0"/>
               <a:t>Fourth level</a:t>
             </a:r>
           </a:p>
           <a:p>
             <a:pPr lvl="4"/>
             <a:r>
-              <a:rPr lang="en-US" dirty="0" smtClean="0"/>
+              <a:rPr lang="en-US" dirty="0"/>
               <a:t>Fifth level</a:t>
             </a:r>
             <a:endParaRPr lang="en-GB" dirty="0"/>
@@ -2145,14 +2199,19 @@
             <p:ph type="dt" sz="half" idx="10"/>
           </p:nvPr>
         </p:nvSpPr>
-        <p:spPr/>
+        <p:spPr>
+          <a:xfrm>
+            <a:off x="251520" y="6356350"/>
+            <a:ext cx="720080" cy="365125"/>
+          </a:xfrm>
+        </p:spPr>
         <p:txBody>
           <a:bodyPr/>
           <a:lstStyle/>
           <a:p>
             <a:fld id="{04A76F9C-33B6-4248-95F4-E755A51BE64F}" type="datetime1">
               <a:rPr lang="en-US" smtClean="0"/>
-              <a:t>4/18/18</a:t>
+              <a:t>1/25/19</a:t>
             </a:fld>
             <a:endParaRPr lang="en-GB"/>
           </a:p>
@@ -2168,12 +2227,21 @@
             <p:ph type="ftr" sz="quarter" idx="11"/>
           </p:nvPr>
         </p:nvSpPr>
-        <p:spPr/>
+        <p:spPr>
+          <a:xfrm>
+            <a:off x="1043608" y="6356350"/>
+            <a:ext cx="7056784" cy="365125"/>
+          </a:xfrm>
+        </p:spPr>
         <p:txBody>
           <a:bodyPr/>
-          <a:lstStyle/>
-          <a:p>
-            <a:endParaRPr lang="en-GB"/>
+          <a:lstStyle>
+            <a:lvl1pPr algn="l">
+              <a:defRPr/>
+            </a:lvl1pPr>
+          </a:lstStyle>
+          <a:p>
+            <a:endParaRPr lang="en-GB" dirty="0"/>
           </a:p>
         </p:txBody>
       </p:sp>
@@ -2187,7 +2255,12 @@
             <p:ph type="sldNum" sz="quarter" idx="12"/>
           </p:nvPr>
         </p:nvSpPr>
-        <p:spPr/>
+        <p:spPr>
+          <a:xfrm>
+            <a:off x="8172400" y="6356350"/>
+            <a:ext cx="720080" cy="365125"/>
+          </a:xfrm>
+        </p:spPr>
         <p:txBody>
           <a:bodyPr/>
           <a:lstStyle/>
@@ -2245,38 +2318,37 @@
           <a:p>
             <a:pPr lvl="0"/>
             <a:r>
-              <a:rPr lang="en-US" dirty="0" smtClean="0"/>
+              <a:rPr lang="en-US" dirty="0"/>
               <a:t>Click to edit Master text styles</a:t>
             </a:r>
           </a:p>
           <a:p>
             <a:pPr lvl="1"/>
             <a:r>
-              <a:rPr lang="en-US" dirty="0" smtClean="0"/>
+              <a:rPr lang="en-US" dirty="0"/>
               <a:t>Second level</a:t>
             </a:r>
           </a:p>
           <a:p>
             <a:pPr lvl="2"/>
             <a:r>
-              <a:rPr lang="en-US" dirty="0" smtClean="0"/>
+              <a:rPr lang="en-US" dirty="0"/>
               <a:t>Third level</a:t>
             </a:r>
           </a:p>
           <a:p>
             <a:pPr lvl="3"/>
             <a:r>
-              <a:rPr lang="en-US" dirty="0" smtClean="0"/>
+              <a:rPr lang="en-US" dirty="0"/>
               <a:t>Fourth level</a:t>
             </a:r>
           </a:p>
           <a:p>
             <a:pPr lvl="4"/>
             <a:r>
-              <a:rPr lang="en-US" dirty="0" smtClean="0"/>
+              <a:rPr lang="en-US" dirty="0"/>
               <a:t>Fifth level</a:t>
             </a:r>
-            <a:endParaRPr lang="en-US" dirty="0"/>
           </a:p>
         </p:txBody>
       </p:sp>
@@ -2339,7 +2411,7 @@
           <a:p>
             <a:pPr lvl="0"/>
             <a:r>
-              <a:rPr lang="en-US" dirty="0" smtClean="0"/>
+              <a:rPr lang="en-US" dirty="0"/>
               <a:t>Click to edit Master text styles</a:t>
             </a:r>
           </a:p>
@@ -2404,7 +2476,7 @@
           <a:p>
             <a:pPr lvl="0"/>
             <a:r>
-              <a:rPr lang="en-US" dirty="0" smtClean="0"/>
+              <a:rPr lang="en-US" dirty="0"/>
               <a:t>Click to edit Master text styles</a:t>
             </a:r>
           </a:p>
@@ -2527,7 +2599,7 @@
           </a:lstStyle>
           <a:p>
             <a:r>
-              <a:rPr lang="en-US" dirty="0" smtClean="0"/>
+              <a:rPr lang="en-US" dirty="0"/>
               <a:t>Click to edit Master title style</a:t>
             </a:r>
             <a:endParaRPr lang="en-GB" dirty="0"/>
@@ -2589,35 +2661,35 @@
           <a:p>
             <a:pPr lvl="0"/>
             <a:r>
-              <a:rPr lang="en-US" dirty="0" smtClean="0"/>
+              <a:rPr lang="en-US" dirty="0"/>
               <a:t>Click to edit Master text styles</a:t>
             </a:r>
           </a:p>
           <a:p>
             <a:pPr lvl="1"/>
             <a:r>
-              <a:rPr lang="en-US" dirty="0" smtClean="0"/>
+              <a:rPr lang="en-US" dirty="0"/>
               <a:t>Second level</a:t>
             </a:r>
           </a:p>
           <a:p>
             <a:pPr lvl="2"/>
             <a:r>
-              <a:rPr lang="en-US" dirty="0" smtClean="0"/>
+              <a:rPr lang="en-US" dirty="0"/>
               <a:t>Third level</a:t>
             </a:r>
           </a:p>
           <a:p>
             <a:pPr lvl="3"/>
             <a:r>
-              <a:rPr lang="en-US" dirty="0" smtClean="0"/>
+              <a:rPr lang="en-US" dirty="0"/>
               <a:t>Fourth level</a:t>
             </a:r>
           </a:p>
           <a:p>
             <a:pPr lvl="4"/>
             <a:r>
-              <a:rPr lang="en-US" dirty="0" smtClean="0"/>
+              <a:rPr lang="en-US" dirty="0"/>
               <a:t>Fifth level</a:t>
             </a:r>
             <a:endParaRPr lang="en-GB" dirty="0"/>
@@ -2679,35 +2751,35 @@
           <a:p>
             <a:pPr lvl="0"/>
             <a:r>
-              <a:rPr lang="en-US" dirty="0" smtClean="0"/>
+              <a:rPr lang="en-US" dirty="0"/>
               <a:t>Click to edit Master text styles</a:t>
             </a:r>
           </a:p>
           <a:p>
             <a:pPr lvl="1"/>
             <a:r>
-              <a:rPr lang="en-US" dirty="0" smtClean="0"/>
+              <a:rPr lang="en-US" dirty="0"/>
               <a:t>Second level</a:t>
             </a:r>
           </a:p>
           <a:p>
             <a:pPr lvl="2"/>
             <a:r>
-              <a:rPr lang="en-US" dirty="0" smtClean="0"/>
+              <a:rPr lang="en-US" dirty="0"/>
               <a:t>Third level</a:t>
             </a:r>
           </a:p>
           <a:p>
             <a:pPr lvl="3"/>
             <a:r>
-              <a:rPr lang="en-US" dirty="0" smtClean="0"/>
+              <a:rPr lang="en-US" dirty="0"/>
               <a:t>Fourth level</a:t>
             </a:r>
           </a:p>
           <a:p>
             <a:pPr lvl="4"/>
             <a:r>
-              <a:rPr lang="en-US" dirty="0" smtClean="0"/>
+              <a:rPr lang="en-US" dirty="0"/>
               <a:t>Fifth level</a:t>
             </a:r>
             <a:endParaRPr lang="en-GB" dirty="0"/>
@@ -2724,14 +2796,19 @@
             <p:ph type="dt" sz="half" idx="10"/>
           </p:nvPr>
         </p:nvSpPr>
-        <p:spPr/>
+        <p:spPr>
+          <a:xfrm>
+            <a:off x="251520" y="6356350"/>
+            <a:ext cx="720080" cy="365125"/>
+          </a:xfrm>
+        </p:spPr>
         <p:txBody>
           <a:bodyPr/>
           <a:lstStyle/>
           <a:p>
             <a:fld id="{7BA53915-059E-FD4B-A198-BD5AD9F97206}" type="datetime1">
               <a:rPr lang="en-US" smtClean="0"/>
-              <a:t>4/18/18</a:t>
+              <a:t>1/25/19</a:t>
             </a:fld>
             <a:endParaRPr lang="en-GB"/>
           </a:p>
@@ -2747,12 +2824,21 @@
             <p:ph type="ftr" sz="quarter" idx="11"/>
           </p:nvPr>
         </p:nvSpPr>
-        <p:spPr/>
+        <p:spPr>
+          <a:xfrm>
+            <a:off x="1043608" y="6356350"/>
+            <a:ext cx="7056784" cy="365125"/>
+          </a:xfrm>
+        </p:spPr>
         <p:txBody>
           <a:bodyPr/>
-          <a:lstStyle/>
-          <a:p>
-            <a:endParaRPr lang="en-GB"/>
+          <a:lstStyle>
+            <a:lvl1pPr algn="l">
+              <a:defRPr/>
+            </a:lvl1pPr>
+          </a:lstStyle>
+          <a:p>
+            <a:endParaRPr lang="en-GB" dirty="0"/>
           </a:p>
         </p:txBody>
       </p:sp>
@@ -2766,7 +2852,12 @@
             <p:ph type="sldNum" sz="quarter" idx="12"/>
           </p:nvPr>
         </p:nvSpPr>
-        <p:spPr/>
+        <p:spPr>
+          <a:xfrm>
+            <a:off x="8172400" y="6356350"/>
+            <a:ext cx="720080" cy="365125"/>
+          </a:xfrm>
+        </p:spPr>
         <p:txBody>
           <a:bodyPr/>
           <a:lstStyle/>
@@ -2824,38 +2915,37 @@
           <a:p>
             <a:pPr lvl="0"/>
             <a:r>
-              <a:rPr lang="en-US" dirty="0" smtClean="0"/>
+              <a:rPr lang="en-US" dirty="0"/>
               <a:t>Click to edit Master text styles</a:t>
             </a:r>
           </a:p>
           <a:p>
             <a:pPr lvl="1"/>
             <a:r>
-              <a:rPr lang="en-US" dirty="0" smtClean="0"/>
+              <a:rPr lang="en-US" dirty="0"/>
               <a:t>Second level</a:t>
             </a:r>
           </a:p>
           <a:p>
             <a:pPr lvl="2"/>
             <a:r>
-              <a:rPr lang="en-US" dirty="0" smtClean="0"/>
+              <a:rPr lang="en-US" dirty="0"/>
               <a:t>Third level</a:t>
             </a:r>
           </a:p>
           <a:p>
             <a:pPr lvl="3"/>
             <a:r>
-              <a:rPr lang="en-US" dirty="0" smtClean="0"/>
+              <a:rPr lang="en-US" dirty="0"/>
               <a:t>Fourth level</a:t>
             </a:r>
           </a:p>
           <a:p>
             <a:pPr lvl="4"/>
             <a:r>
-              <a:rPr lang="en-US" dirty="0" smtClean="0"/>
+              <a:rPr lang="en-US" dirty="0"/>
               <a:t>Fifth level</a:t>
             </a:r>
-            <a:endParaRPr lang="en-US" dirty="0"/>
           </a:p>
         </p:txBody>
       </p:sp>
@@ -2918,7 +3008,7 @@
           <a:p>
             <a:pPr lvl="0"/>
             <a:r>
-              <a:rPr lang="en-US" dirty="0" smtClean="0"/>
+              <a:rPr lang="en-US" dirty="0"/>
               <a:t>Click to edit Master text styles</a:t>
             </a:r>
           </a:p>
@@ -2983,7 +3073,7 @@
           <a:p>
             <a:pPr lvl="0"/>
             <a:r>
-              <a:rPr lang="en-US" dirty="0" smtClean="0"/>
+              <a:rPr lang="en-US" dirty="0"/>
               <a:t>Click to edit Master text styles</a:t>
             </a:r>
           </a:p>
@@ -3106,7 +3196,7 @@
           </a:lstStyle>
           <a:p>
             <a:r>
-              <a:rPr lang="en-US" dirty="0" smtClean="0"/>
+              <a:rPr lang="en-US" dirty="0"/>
               <a:t>Click to edit Master title style</a:t>
             </a:r>
             <a:endParaRPr lang="en-GB" dirty="0"/>
@@ -3163,35 +3253,35 @@
           <a:p>
             <a:pPr lvl="0"/>
             <a:r>
-              <a:rPr lang="en-US" smtClean="0"/>
+              <a:rPr lang="en-US"/>
               <a:t>Click to edit Master text styles</a:t>
             </a:r>
           </a:p>
           <a:p>
             <a:pPr lvl="1"/>
             <a:r>
-              <a:rPr lang="en-US" smtClean="0"/>
+              <a:rPr lang="en-US"/>
               <a:t>Second level</a:t>
             </a:r>
           </a:p>
           <a:p>
             <a:pPr lvl="2"/>
             <a:r>
-              <a:rPr lang="en-US" smtClean="0"/>
+              <a:rPr lang="en-US"/>
               <a:t>Third level</a:t>
             </a:r>
           </a:p>
           <a:p>
             <a:pPr lvl="3"/>
             <a:r>
-              <a:rPr lang="en-US" smtClean="0"/>
+              <a:rPr lang="en-US"/>
               <a:t>Fourth level</a:t>
             </a:r>
           </a:p>
           <a:p>
             <a:pPr lvl="4"/>
             <a:r>
-              <a:rPr lang="en-US" smtClean="0"/>
+              <a:rPr lang="en-US"/>
               <a:t>Fifth level</a:t>
             </a:r>
             <a:endParaRPr lang="en-GB"/>
@@ -3248,35 +3338,35 @@
           <a:p>
             <a:pPr lvl="0"/>
             <a:r>
-              <a:rPr lang="en-US" dirty="0" smtClean="0"/>
+              <a:rPr lang="en-US" dirty="0"/>
               <a:t>Click to edit Master text styles</a:t>
             </a:r>
           </a:p>
           <a:p>
             <a:pPr lvl="1"/>
             <a:r>
-              <a:rPr lang="en-US" dirty="0" smtClean="0"/>
+              <a:rPr lang="en-US" dirty="0"/>
               <a:t>Second level</a:t>
             </a:r>
           </a:p>
           <a:p>
             <a:pPr lvl="2"/>
             <a:r>
-              <a:rPr lang="en-US" dirty="0" smtClean="0"/>
+              <a:rPr lang="en-US" dirty="0"/>
               <a:t>Third level</a:t>
             </a:r>
           </a:p>
           <a:p>
             <a:pPr lvl="3"/>
             <a:r>
-              <a:rPr lang="en-US" dirty="0" smtClean="0"/>
+              <a:rPr lang="en-US" dirty="0"/>
               <a:t>Fourth level</a:t>
             </a:r>
           </a:p>
           <a:p>
             <a:pPr lvl="4"/>
             <a:r>
-              <a:rPr lang="en-US" dirty="0" smtClean="0"/>
+              <a:rPr lang="en-US" dirty="0"/>
               <a:t>Fifth level</a:t>
             </a:r>
             <a:endParaRPr lang="en-GB" dirty="0"/>
@@ -3293,14 +3383,19 @@
             <p:ph type="dt" sz="half" idx="10"/>
           </p:nvPr>
         </p:nvSpPr>
-        <p:spPr/>
+        <p:spPr>
+          <a:xfrm>
+            <a:off x="251520" y="6356350"/>
+            <a:ext cx="720080" cy="365125"/>
+          </a:xfrm>
+        </p:spPr>
         <p:txBody>
           <a:bodyPr/>
           <a:lstStyle/>
           <a:p>
             <a:fld id="{F7C6CE28-510F-5240-BB2D-5CAA84033ED0}" type="datetime1">
               <a:rPr lang="en-US" smtClean="0"/>
-              <a:t>4/18/18</a:t>
+              <a:t>1/25/19</a:t>
             </a:fld>
             <a:endParaRPr lang="en-GB"/>
           </a:p>
@@ -3316,12 +3411,21 @@
             <p:ph type="ftr" sz="quarter" idx="11"/>
           </p:nvPr>
         </p:nvSpPr>
-        <p:spPr/>
+        <p:spPr>
+          <a:xfrm>
+            <a:off x="1043608" y="6356350"/>
+            <a:ext cx="7056784" cy="365125"/>
+          </a:xfrm>
+        </p:spPr>
         <p:txBody>
           <a:bodyPr/>
-          <a:lstStyle/>
-          <a:p>
-            <a:endParaRPr lang="en-GB"/>
+          <a:lstStyle>
+            <a:lvl1pPr algn="l">
+              <a:defRPr/>
+            </a:lvl1pPr>
+          </a:lstStyle>
+          <a:p>
+            <a:endParaRPr lang="en-GB" dirty="0"/>
           </a:p>
         </p:txBody>
       </p:sp>
@@ -3335,7 +3439,12 @@
             <p:ph type="sldNum" sz="quarter" idx="12"/>
           </p:nvPr>
         </p:nvSpPr>
-        <p:spPr/>
+        <p:spPr>
+          <a:xfrm>
+            <a:off x="8172400" y="6356350"/>
+            <a:ext cx="720080" cy="365125"/>
+          </a:xfrm>
+        </p:spPr>
         <p:txBody>
           <a:bodyPr/>
           <a:lstStyle/>
@@ -3393,38 +3502,37 @@
           <a:p>
             <a:pPr lvl="0"/>
             <a:r>
-              <a:rPr lang="en-US" dirty="0" smtClean="0"/>
+              <a:rPr lang="en-US" dirty="0"/>
               <a:t>Click to edit Master text styles</a:t>
             </a:r>
           </a:p>
           <a:p>
             <a:pPr lvl="1"/>
             <a:r>
-              <a:rPr lang="en-US" dirty="0" smtClean="0"/>
+              <a:rPr lang="en-US" dirty="0"/>
               <a:t>Second level</a:t>
             </a:r>
           </a:p>
           <a:p>
             <a:pPr lvl="2"/>
             <a:r>
-              <a:rPr lang="en-US" dirty="0" smtClean="0"/>
+              <a:rPr lang="en-US" dirty="0"/>
               <a:t>Third level</a:t>
             </a:r>
           </a:p>
           <a:p>
             <a:pPr lvl="3"/>
             <a:r>
-              <a:rPr lang="en-US" dirty="0" smtClean="0"/>
+              <a:rPr lang="en-US" dirty="0"/>
               <a:t>Fourth level</a:t>
             </a:r>
           </a:p>
           <a:p>
             <a:pPr lvl="4"/>
             <a:r>
-              <a:rPr lang="en-US" dirty="0" smtClean="0"/>
+              <a:rPr lang="en-US" dirty="0"/>
               <a:t>Fifth level</a:t>
             </a:r>
-            <a:endParaRPr lang="en-US" dirty="0"/>
           </a:p>
         </p:txBody>
       </p:sp>
@@ -3545,7 +3653,7 @@
           </a:lstStyle>
           <a:p>
             <a:r>
-              <a:rPr lang="en-US" dirty="0" smtClean="0"/>
+              <a:rPr lang="en-US" dirty="0"/>
               <a:t>Click to edit Master title style</a:t>
             </a:r>
             <a:endParaRPr lang="en-GB" dirty="0"/>
@@ -3607,35 +3715,35 @@
           <a:p>
             <a:pPr lvl="0"/>
             <a:r>
-              <a:rPr lang="en-US" dirty="0" smtClean="0"/>
+              <a:rPr lang="en-US" dirty="0"/>
               <a:t>Click to edit Master text styles</a:t>
             </a:r>
           </a:p>
           <a:p>
             <a:pPr lvl="1"/>
             <a:r>
-              <a:rPr lang="en-US" dirty="0" smtClean="0"/>
+              <a:rPr lang="en-US" dirty="0"/>
               <a:t>Second level</a:t>
             </a:r>
           </a:p>
           <a:p>
             <a:pPr lvl="2"/>
             <a:r>
-              <a:rPr lang="en-US" dirty="0" smtClean="0"/>
+              <a:rPr lang="en-US" dirty="0"/>
               <a:t>Third level</a:t>
             </a:r>
           </a:p>
           <a:p>
             <a:pPr lvl="3"/>
             <a:r>
-              <a:rPr lang="en-US" dirty="0" smtClean="0"/>
+              <a:rPr lang="en-US" dirty="0"/>
               <a:t>Fourth level</a:t>
             </a:r>
           </a:p>
           <a:p>
             <a:pPr lvl="4"/>
             <a:r>
-              <a:rPr lang="en-US" dirty="0" smtClean="0"/>
+              <a:rPr lang="en-US" dirty="0"/>
               <a:t>Fifth level</a:t>
             </a:r>
             <a:endParaRPr lang="en-GB" dirty="0"/>
@@ -3697,35 +3805,35 @@
           <a:p>
             <a:pPr lvl="0"/>
             <a:r>
-              <a:rPr lang="en-US" dirty="0" smtClean="0"/>
+              <a:rPr lang="en-US" dirty="0"/>
               <a:t>Click to edit Master text styles</a:t>
             </a:r>
           </a:p>
           <a:p>
             <a:pPr lvl="1"/>
             <a:r>
-              <a:rPr lang="en-US" dirty="0" smtClean="0"/>
+              <a:rPr lang="en-US" dirty="0"/>
               <a:t>Second level</a:t>
             </a:r>
           </a:p>
           <a:p>
             <a:pPr lvl="2"/>
             <a:r>
-              <a:rPr lang="en-US" dirty="0" smtClean="0"/>
+              <a:rPr lang="en-US" dirty="0"/>
               <a:t>Third level</a:t>
             </a:r>
           </a:p>
           <a:p>
             <a:pPr lvl="3"/>
             <a:r>
-              <a:rPr lang="en-US" dirty="0" smtClean="0"/>
+              <a:rPr lang="en-US" dirty="0"/>
               <a:t>Fourth level</a:t>
             </a:r>
           </a:p>
           <a:p>
             <a:pPr lvl="4"/>
             <a:r>
-              <a:rPr lang="en-US" dirty="0" smtClean="0"/>
+              <a:rPr lang="en-US" dirty="0"/>
               <a:t>Fifth level</a:t>
             </a:r>
             <a:endParaRPr lang="en-GB" dirty="0"/>
@@ -3742,14 +3850,19 @@
             <p:ph type="dt" sz="half" idx="10"/>
           </p:nvPr>
         </p:nvSpPr>
-        <p:spPr/>
+        <p:spPr>
+          <a:xfrm>
+            <a:off x="251520" y="6356350"/>
+            <a:ext cx="720080" cy="365125"/>
+          </a:xfrm>
+        </p:spPr>
         <p:txBody>
           <a:bodyPr/>
           <a:lstStyle/>
           <a:p>
             <a:fld id="{DC8473B6-9DB1-6841-865B-A1275004FC4D}" type="datetime1">
               <a:rPr lang="en-US" smtClean="0"/>
-              <a:t>4/18/18</a:t>
+              <a:t>1/25/19</a:t>
             </a:fld>
             <a:endParaRPr lang="en-GB"/>
           </a:p>
@@ -3765,12 +3878,21 @@
             <p:ph type="ftr" sz="quarter" idx="11"/>
           </p:nvPr>
         </p:nvSpPr>
-        <p:spPr/>
+        <p:spPr>
+          <a:xfrm>
+            <a:off x="1043608" y="6356350"/>
+            <a:ext cx="7056784" cy="365125"/>
+          </a:xfrm>
+        </p:spPr>
         <p:txBody>
           <a:bodyPr/>
-          <a:lstStyle/>
-          <a:p>
-            <a:endParaRPr lang="en-GB"/>
+          <a:lstStyle>
+            <a:lvl1pPr algn="l">
+              <a:defRPr/>
+            </a:lvl1pPr>
+          </a:lstStyle>
+          <a:p>
+            <a:endParaRPr lang="en-GB" dirty="0"/>
           </a:p>
         </p:txBody>
       </p:sp>
@@ -3784,7 +3906,12 @@
             <p:ph type="sldNum" sz="quarter" idx="12"/>
           </p:nvPr>
         </p:nvSpPr>
-        <p:spPr/>
+        <p:spPr>
+          <a:xfrm>
+            <a:off x="8172400" y="6356350"/>
+            <a:ext cx="720080" cy="365125"/>
+          </a:xfrm>
+        </p:spPr>
         <p:txBody>
           <a:bodyPr/>
           <a:lstStyle/>
@@ -3842,38 +3969,37 @@
           <a:p>
             <a:pPr lvl="0"/>
             <a:r>
-              <a:rPr lang="en-US" dirty="0" smtClean="0"/>
+              <a:rPr lang="en-US" dirty="0"/>
               <a:t>Click to edit Master text styles</a:t>
             </a:r>
           </a:p>
           <a:p>
             <a:pPr lvl="1"/>
             <a:r>
-              <a:rPr lang="en-US" dirty="0" smtClean="0"/>
+              <a:rPr lang="en-US" dirty="0"/>
               <a:t>Second level</a:t>
             </a:r>
           </a:p>
           <a:p>
             <a:pPr lvl="2"/>
             <a:r>
-              <a:rPr lang="en-US" dirty="0" smtClean="0"/>
+              <a:rPr lang="en-US" dirty="0"/>
               <a:t>Third level</a:t>
             </a:r>
           </a:p>
           <a:p>
             <a:pPr lvl="3"/>
             <a:r>
-              <a:rPr lang="en-US" dirty="0" smtClean="0"/>
+              <a:rPr lang="en-US" dirty="0"/>
               <a:t>Fourth level</a:t>
             </a:r>
           </a:p>
           <a:p>
             <a:pPr lvl="4"/>
             <a:r>
-              <a:rPr lang="en-US" dirty="0" smtClean="0"/>
+              <a:rPr lang="en-US" dirty="0"/>
               <a:t>Fifth level</a:t>
             </a:r>
-            <a:endParaRPr lang="en-US" dirty="0"/>
           </a:p>
         </p:txBody>
       </p:sp>
@@ -3960,7 +4086,7 @@
           </a:lstStyle>
           <a:p>
             <a:r>
-              <a:rPr lang="en-US" dirty="0" smtClean="0"/>
+              <a:rPr lang="en-US" dirty="0"/>
               <a:t>Click to edit Master title style</a:t>
             </a:r>
             <a:endParaRPr lang="en-GB" dirty="0"/>
@@ -3977,14 +4103,19 @@
             <p:ph type="dt" sz="half" idx="10"/>
           </p:nvPr>
         </p:nvSpPr>
-        <p:spPr/>
+        <p:spPr>
+          <a:xfrm>
+            <a:off x="251520" y="6356350"/>
+            <a:ext cx="720080" cy="365125"/>
+          </a:xfrm>
+        </p:spPr>
         <p:txBody>
           <a:bodyPr/>
           <a:lstStyle/>
           <a:p>
             <a:fld id="{D871C1FE-9025-5C49-BA5C-C24D6151D8FF}" type="datetime1">
               <a:rPr lang="en-US" smtClean="0"/>
-              <a:t>4/18/18</a:t>
+              <a:t>1/25/19</a:t>
             </a:fld>
             <a:endParaRPr lang="en-GB"/>
           </a:p>
@@ -4000,12 +4131,21 @@
             <p:ph type="ftr" sz="quarter" idx="11"/>
           </p:nvPr>
         </p:nvSpPr>
-        <p:spPr/>
+        <p:spPr>
+          <a:xfrm>
+            <a:off x="1043608" y="6356350"/>
+            <a:ext cx="7056784" cy="365125"/>
+          </a:xfrm>
+        </p:spPr>
         <p:txBody>
           <a:bodyPr/>
-          <a:lstStyle/>
-          <a:p>
-            <a:endParaRPr lang="en-GB"/>
+          <a:lstStyle>
+            <a:lvl1pPr algn="l">
+              <a:defRPr/>
+            </a:lvl1pPr>
+          </a:lstStyle>
+          <a:p>
+            <a:endParaRPr lang="en-GB" dirty="0"/>
           </a:p>
         </p:txBody>
       </p:sp>
@@ -4019,7 +4159,12 @@
             <p:ph type="sldNum" sz="quarter" idx="12"/>
           </p:nvPr>
         </p:nvSpPr>
-        <p:spPr/>
+        <p:spPr>
+          <a:xfrm>
+            <a:off x="8172400" y="6356350"/>
+            <a:ext cx="720080" cy="365125"/>
+          </a:xfrm>
+        </p:spPr>
         <p:txBody>
           <a:bodyPr/>
           <a:lstStyle/>
@@ -4122,7 +4267,7 @@
           <a:lstStyle/>
           <a:p>
             <a:r>
-              <a:rPr lang="en-US" dirty="0" smtClean="0"/>
+              <a:rPr lang="en-US" dirty="0"/>
               <a:t>Click to edit Master title style</a:t>
             </a:r>
             <a:endParaRPr lang="en-GB" dirty="0"/>
@@ -4156,35 +4301,35 @@
           <a:p>
             <a:pPr lvl="0"/>
             <a:r>
-              <a:rPr lang="en-US" smtClean="0"/>
+              <a:rPr lang="en-US"/>
               <a:t>Click to edit Master text styles</a:t>
             </a:r>
           </a:p>
           <a:p>
             <a:pPr lvl="1"/>
             <a:r>
-              <a:rPr lang="en-US" smtClean="0"/>
+              <a:rPr lang="en-US"/>
               <a:t>Second level</a:t>
             </a:r>
           </a:p>
           <a:p>
             <a:pPr lvl="2"/>
             <a:r>
-              <a:rPr lang="en-US" smtClean="0"/>
+              <a:rPr lang="en-US"/>
               <a:t>Third level</a:t>
             </a:r>
           </a:p>
           <a:p>
             <a:pPr lvl="3"/>
             <a:r>
-              <a:rPr lang="en-US" smtClean="0"/>
+              <a:rPr lang="en-US"/>
               <a:t>Fourth level</a:t>
             </a:r>
           </a:p>
           <a:p>
             <a:pPr lvl="4"/>
             <a:r>
-              <a:rPr lang="en-US" smtClean="0"/>
+              <a:rPr lang="en-US"/>
               <a:t>Fifth level</a:t>
             </a:r>
             <a:endParaRPr lang="en-GB"/>
@@ -4204,7 +4349,7 @@
         <p:spPr>
           <a:xfrm>
             <a:off x="251520" y="6356350"/>
-            <a:ext cx="2339280" cy="365125"/>
+            <a:ext cx="720080" cy="365125"/>
           </a:xfrm>
           <a:prstGeom prst="rect">
             <a:avLst/>
@@ -4226,9 +4371,9 @@
           <a:p>
             <a:fld id="{13B1BC43-4B43-954F-8BAE-86993A84B7B7}" type="datetime1">
               <a:rPr lang="en-US" smtClean="0"/>
-              <a:t>4/18/18</a:t>
+              <a:t>1/25/19</a:t>
             </a:fld>
-            <a:endParaRPr lang="en-GB"/>
+            <a:endParaRPr lang="en-GB" dirty="0"/>
           </a:p>
         </p:txBody>
       </p:sp>
@@ -4244,8 +4389,8 @@
         </p:nvSpPr>
         <p:spPr>
           <a:xfrm>
-            <a:off x="2699792" y="6356350"/>
-            <a:ext cx="3960440" cy="365125"/>
+            <a:off x="1043608" y="6356350"/>
+            <a:ext cx="7056784" cy="365125"/>
           </a:xfrm>
           <a:prstGeom prst="rect">
             <a:avLst/>
@@ -4254,7 +4399,7 @@
         <p:txBody>
           <a:bodyPr vert="horz" lIns="91440" tIns="45720" rIns="91440" bIns="45720" rtlCol="0" anchor="ctr"/>
           <a:lstStyle>
-            <a:lvl1pPr algn="ctr">
+            <a:lvl1pPr algn="l">
               <a:defRPr sz="1200">
                 <a:solidFill>
                   <a:schemeClr val="tx1">
@@ -4281,8 +4426,8 @@
         </p:nvSpPr>
         <p:spPr>
           <a:xfrm>
-            <a:off x="6758880" y="6356350"/>
-            <a:ext cx="2133600" cy="365125"/>
+            <a:off x="8172400" y="6356350"/>
+            <a:ext cx="720080" cy="365125"/>
           </a:xfrm>
           <a:prstGeom prst="rect">
             <a:avLst/>

</xml_diff>

<commit_message>
Added NCA options: C0 extrapolation Analysis of sparse sampled data Workshop components
</commit_message>
<xml_diff>
--- a/inst/ubinc/templates/report.pptx
+++ b/inst/ubinc/templates/report.pptx
@@ -211,7 +211,7 @@
           <a:p>
             <a:fld id="{1B656253-81D4-504C-9F22-C43A5586B7F8}" type="datetimeFigureOut">
               <a:rPr lang="en-US" smtClean="0"/>
-              <a:t>5/5/19</a:t>
+              <a:t>7/1/19</a:t>
             </a:fld>
             <a:endParaRPr lang="en-US"/>
           </a:p>
@@ -377,7 +377,7 @@
           <a:p>
             <a:fld id="{EEA38B4D-A065-A048-981C-DE16882AB0B1}" type="datetimeFigureOut">
               <a:rPr lang="en-US" smtClean="0"/>
-              <a:t>5/5/19</a:t>
+              <a:t>7/1/19</a:t>
             </a:fld>
             <a:endParaRPr lang="en-US"/>
           </a:p>
@@ -931,7 +931,7 @@
           <a:p>
             <a:fld id="{52BA1850-337E-7747-91FB-64B4051995E4}" type="datetime1">
               <a:rPr lang="en-US" smtClean="0"/>
-              <a:t>5/5/19</a:t>
+              <a:t>7/1/19</a:t>
             </a:fld>
             <a:endParaRPr lang="en-GB"/>
           </a:p>
@@ -1167,7 +1167,7 @@
           <a:p>
             <a:fld id="{BB662456-9DF9-7F42-9863-03F75BEC0447}" type="datetime1">
               <a:rPr lang="en-US" smtClean="0"/>
-              <a:t>5/5/19</a:t>
+              <a:t>7/1/19</a:t>
             </a:fld>
             <a:endParaRPr lang="en-GB"/>
           </a:p>
@@ -1503,7 +1503,7 @@
           <a:p>
             <a:fld id="{AA0DAA0C-97E8-DA4A-9975-EC4E464C2F40}" type="datetime1">
               <a:rPr lang="en-US" smtClean="0"/>
-              <a:t>5/5/19</a:t>
+              <a:t>7/1/19</a:t>
             </a:fld>
             <a:endParaRPr lang="en-GB"/>
           </a:p>
@@ -2184,7 +2184,7 @@
           <a:p>
             <a:fld id="{04A76F9C-33B6-4248-95F4-E755A51BE64F}" type="datetime1">
               <a:rPr lang="en-US" smtClean="0"/>
-              <a:t>5/5/19</a:t>
+              <a:t>7/1/19</a:t>
             </a:fld>
             <a:endParaRPr lang="en-GB"/>
           </a:p>
@@ -2567,27 +2567,29 @@
           </a:xfrm>
         </p:spPr>
         <p:txBody>
-          <a:bodyPr/>
+          <a:bodyPr>
+            <a:normAutofit/>
+          </a:bodyPr>
           <a:lstStyle>
             <a:lvl1pPr marL="0" indent="0">
               <a:buNone/>
-              <a:defRPr sz="2800"/>
+              <a:defRPr sz="2400"/>
             </a:lvl1pPr>
             <a:lvl2pPr marL="457200" indent="0">
               <a:buNone/>
-              <a:defRPr sz="2400"/>
+              <a:defRPr sz="2000"/>
             </a:lvl2pPr>
             <a:lvl3pPr marL="914400" indent="0">
               <a:buNone/>
-              <a:defRPr sz="2000"/>
+              <a:defRPr sz="1800"/>
             </a:lvl3pPr>
             <a:lvl4pPr marL="1371600" indent="0">
               <a:buNone/>
-              <a:defRPr sz="1800"/>
+              <a:defRPr sz="1600"/>
             </a:lvl4pPr>
             <a:lvl5pPr marL="1828800" indent="0">
               <a:buNone/>
-              <a:defRPr sz="1800"/>
+              <a:defRPr sz="1600"/>
             </a:lvl5pPr>
             <a:lvl6pPr>
               <a:defRPr sz="1800"/>
@@ -2657,27 +2659,29 @@
           </a:xfrm>
         </p:spPr>
         <p:txBody>
-          <a:bodyPr/>
+          <a:bodyPr>
+            <a:normAutofit/>
+          </a:bodyPr>
           <a:lstStyle>
             <a:lvl1pPr marL="0" indent="0">
               <a:buNone/>
-              <a:defRPr sz="2800"/>
+              <a:defRPr sz="2400"/>
             </a:lvl1pPr>
             <a:lvl2pPr marL="457200" indent="0">
               <a:buNone/>
-              <a:defRPr sz="2400"/>
+              <a:defRPr sz="2000"/>
             </a:lvl2pPr>
             <a:lvl3pPr marL="914400" indent="0">
               <a:buNone/>
-              <a:defRPr sz="2000"/>
+              <a:defRPr sz="1800"/>
             </a:lvl3pPr>
             <a:lvl4pPr marL="1371600" indent="0">
               <a:buNone/>
-              <a:defRPr sz="1800"/>
+              <a:defRPr sz="1600"/>
             </a:lvl4pPr>
             <a:lvl5pPr marL="1828800" indent="0">
               <a:buNone/>
-              <a:defRPr sz="1800"/>
+              <a:defRPr sz="1600"/>
             </a:lvl5pPr>
             <a:lvl6pPr>
               <a:defRPr sz="1800"/>
@@ -2752,7 +2756,7 @@
           <a:p>
             <a:fld id="{7BA53915-059E-FD4B-A198-BD5AD9F97206}" type="datetime1">
               <a:rPr lang="en-US" smtClean="0"/>
-              <a:t>5/5/19</a:t>
+              <a:t>7/1/19</a:t>
             </a:fld>
             <a:endParaRPr lang="en-GB"/>
           </a:p>
@@ -3135,22 +3139,24 @@
           </a:xfrm>
         </p:spPr>
         <p:txBody>
-          <a:bodyPr/>
+          <a:bodyPr>
+            <a:normAutofit/>
+          </a:bodyPr>
           <a:lstStyle>
             <a:lvl1pPr>
-              <a:defRPr sz="2800"/>
+              <a:defRPr sz="2400"/>
             </a:lvl1pPr>
             <a:lvl2pPr>
-              <a:defRPr sz="2400"/>
+              <a:defRPr sz="2000"/>
             </a:lvl2pPr>
             <a:lvl3pPr>
-              <a:defRPr sz="2000"/>
+              <a:defRPr sz="1800"/>
             </a:lvl3pPr>
             <a:lvl4pPr>
-              <a:defRPr sz="1800"/>
+              <a:defRPr sz="1600"/>
             </a:lvl4pPr>
             <a:lvl5pPr>
-              <a:defRPr sz="1800"/>
+              <a:defRPr sz="1600"/>
             </a:lvl5pPr>
             <a:lvl6pPr>
               <a:defRPr sz="1800"/>
@@ -3220,22 +3226,24 @@
           </a:xfrm>
         </p:spPr>
         <p:txBody>
-          <a:bodyPr/>
+          <a:bodyPr>
+            <a:normAutofit/>
+          </a:bodyPr>
           <a:lstStyle>
             <a:lvl1pPr>
-              <a:defRPr sz="2800"/>
+              <a:defRPr sz="2400"/>
             </a:lvl1pPr>
             <a:lvl2pPr>
-              <a:defRPr sz="2400"/>
+              <a:defRPr sz="2000"/>
             </a:lvl2pPr>
             <a:lvl3pPr>
-              <a:defRPr sz="2000"/>
+              <a:defRPr sz="1800"/>
             </a:lvl3pPr>
             <a:lvl4pPr>
-              <a:defRPr sz="1800"/>
+              <a:defRPr sz="1600"/>
             </a:lvl4pPr>
             <a:lvl5pPr>
-              <a:defRPr sz="1800"/>
+              <a:defRPr sz="1600"/>
             </a:lvl5pPr>
             <a:lvl6pPr>
               <a:defRPr sz="1800"/>
@@ -3310,7 +3318,7 @@
           <a:p>
             <a:fld id="{F7C6CE28-510F-5240-BB2D-5CAA84033ED0}" type="datetime1">
               <a:rPr lang="en-US" smtClean="0"/>
-              <a:t>5/5/19</a:t>
+              <a:t>7/1/19</a:t>
             </a:fld>
             <a:endParaRPr lang="en-GB"/>
           </a:p>
@@ -3563,27 +3571,29 @@
           </a:xfrm>
         </p:spPr>
         <p:txBody>
-          <a:bodyPr/>
+          <a:bodyPr>
+            <a:normAutofit/>
+          </a:bodyPr>
           <a:lstStyle>
             <a:lvl1pPr marL="0" indent="0">
               <a:buNone/>
-              <a:defRPr sz="2800"/>
+              <a:defRPr sz="2400"/>
             </a:lvl1pPr>
             <a:lvl2pPr marL="457200" indent="0">
               <a:buNone/>
-              <a:defRPr sz="2400"/>
+              <a:defRPr sz="2000"/>
             </a:lvl2pPr>
             <a:lvl3pPr marL="914400" indent="0">
               <a:buNone/>
-              <a:defRPr sz="2000"/>
+              <a:defRPr sz="1800"/>
             </a:lvl3pPr>
             <a:lvl4pPr marL="1371600" indent="0">
               <a:buNone/>
-              <a:defRPr sz="1800"/>
+              <a:defRPr sz="1600"/>
             </a:lvl4pPr>
             <a:lvl5pPr marL="1828800" indent="0">
               <a:buNone/>
-              <a:defRPr sz="1800"/>
+              <a:defRPr sz="1600"/>
             </a:lvl5pPr>
             <a:lvl6pPr>
               <a:defRPr sz="1800"/>
@@ -3653,27 +3663,29 @@
           </a:xfrm>
         </p:spPr>
         <p:txBody>
-          <a:bodyPr/>
+          <a:bodyPr>
+            <a:normAutofit/>
+          </a:bodyPr>
           <a:lstStyle>
             <a:lvl1pPr marL="0" indent="0">
               <a:buNone/>
-              <a:defRPr sz="2800"/>
+              <a:defRPr sz="2400"/>
             </a:lvl1pPr>
             <a:lvl2pPr marL="457200" indent="0">
               <a:buNone/>
-              <a:defRPr sz="2400"/>
+              <a:defRPr sz="2000"/>
             </a:lvl2pPr>
             <a:lvl3pPr marL="914400" indent="0">
               <a:buNone/>
-              <a:defRPr sz="2000"/>
+              <a:defRPr sz="1800"/>
             </a:lvl3pPr>
             <a:lvl4pPr marL="1371600" indent="0">
               <a:buNone/>
-              <a:defRPr sz="1800"/>
+              <a:defRPr sz="1600"/>
             </a:lvl4pPr>
             <a:lvl5pPr marL="1828800" indent="0">
               <a:buNone/>
-              <a:defRPr sz="1800"/>
+              <a:defRPr sz="1600"/>
             </a:lvl5pPr>
             <a:lvl6pPr>
               <a:defRPr sz="1800"/>
@@ -3748,7 +3760,7 @@
           <a:p>
             <a:fld id="{DC8473B6-9DB1-6841-865B-A1275004FC4D}" type="datetime1">
               <a:rPr lang="en-US" smtClean="0"/>
-              <a:t>5/5/19</a:t>
+              <a:t>7/1/19</a:t>
             </a:fld>
             <a:endParaRPr lang="en-GB"/>
           </a:p>
@@ -4001,7 +4013,7 @@
           <a:p>
             <a:fld id="{D871C1FE-9025-5C49-BA5C-C24D6151D8FF}" type="datetime1">
               <a:rPr lang="en-US" smtClean="0"/>
-              <a:t>5/5/19</a:t>
+              <a:t>7/1/19</a:t>
             </a:fld>
             <a:endParaRPr lang="en-GB"/>
           </a:p>
@@ -4228,7 +4240,7 @@
           <a:p>
             <a:fld id="{13B1BC43-4B43-954F-8BAE-86993A84B7B7}" type="datetime1">
               <a:rPr lang="en-US" smtClean="0"/>
-              <a:t>5/5/19</a:t>
+              <a:t>7/1/19</a:t>
             </a:fld>
             <a:endParaRPr lang="en-GB" dirty="0"/>
           </a:p>

</xml_diff>

<commit_message>
The latest version of officer had changes that broke reporting. This addresses those changes. These changes will require editing any orgaizational functions used for custom templates and will probably break compatability with the previous version. This now requires officer version 0.3.5 or higher.
</commit_message>
<xml_diff>
--- a/inst/ubinc/templates/report.pptx
+++ b/inst/ubinc/templates/report.pptx
@@ -211,7 +211,7 @@
           <a:p>
             <a:fld id="{1B656253-81D4-504C-9F22-C43A5586B7F8}" type="datetimeFigureOut">
               <a:rPr lang="en-US" smtClean="0"/>
-              <a:t>7/1/19</a:t>
+              <a:t>7/21/19</a:t>
             </a:fld>
             <a:endParaRPr lang="en-US"/>
           </a:p>
@@ -377,7 +377,7 @@
           <a:p>
             <a:fld id="{EEA38B4D-A065-A048-981C-DE16882AB0B1}" type="datetimeFigureOut">
               <a:rPr lang="en-US" smtClean="0"/>
-              <a:t>7/1/19</a:t>
+              <a:t>7/21/19</a:t>
             </a:fld>
             <a:endParaRPr lang="en-US"/>
           </a:p>
@@ -705,6 +705,9 @@
             <a:off x="1371600" y="3886200"/>
             <a:ext cx="6400800" cy="1752600"/>
           </a:xfrm>
+          <a:prstGeom prst="rect">
+            <a:avLst/>
+          </a:prstGeom>
         </p:spPr>
         <p:txBody>
           <a:bodyPr/>
@@ -931,7 +934,7 @@
           <a:p>
             <a:fld id="{52BA1850-337E-7747-91FB-64B4051995E4}" type="datetime1">
               <a:rPr lang="en-US" smtClean="0"/>
-              <a:t>7/1/19</a:t>
+              <a:t>7/21/19</a:t>
             </a:fld>
             <a:endParaRPr lang="en-GB"/>
           </a:p>
@@ -1007,6 +1010,348 @@
 </file>
 
 <file path=ppt/slideLayouts/slideLayout2.xml><?xml version="1.0" encoding="utf-8"?>
+<p:sldLayout xmlns:a="http://schemas.openxmlformats.org/drawingml/2006/main" xmlns:r="http://schemas.openxmlformats.org/officeDocument/2006/relationships" xmlns:p="http://schemas.openxmlformats.org/presentationml/2006/main" preserve="1" userDrawn="1">
+  <p:cSld name="content_text">
+    <p:spTree>
+      <p:nvGrpSpPr>
+        <p:cNvPr id="1" name=""/>
+        <p:cNvGrpSpPr/>
+        <p:nvPr/>
+      </p:nvGrpSpPr>
+      <p:grpSpPr>
+        <a:xfrm>
+          <a:off x="0" y="0"/>
+          <a:ext cx="0" cy="0"/>
+          <a:chOff x="0" y="0"/>
+          <a:chExt cx="0" cy="0"/>
+        </a:xfrm>
+      </p:grpSpPr>
+      <p:pic>
+        <p:nvPicPr>
+          <p:cNvPr id="9" name="Picture 8" descr="slide_background_tall.png"/>
+          <p:cNvPicPr>
+            <a:picLocks noChangeAspect="1"/>
+          </p:cNvPicPr>
+          <p:nvPr userDrawn="1"/>
+        </p:nvPicPr>
+        <p:blipFill>
+          <a:blip r:embed="rId2">
+            <a:extLst>
+              <a:ext uri="{28A0092B-C50C-407E-A947-70E740481C1C}">
+                <a14:useLocalDpi xmlns:a14="http://schemas.microsoft.com/office/drawing/2010/main" val="0"/>
+              </a:ext>
+            </a:extLst>
+          </a:blip>
+          <a:stretch>
+            <a:fillRect/>
+          </a:stretch>
+        </p:blipFill>
+        <p:spPr>
+          <a:xfrm>
+            <a:off x="0" y="-27384"/>
+            <a:ext cx="9144000" cy="1493881"/>
+          </a:xfrm>
+          <a:prstGeom prst="rect">
+            <a:avLst/>
+          </a:prstGeom>
+        </p:spPr>
+      </p:pic>
+      <p:sp>
+        <p:nvSpPr>
+          <p:cNvPr id="2" name="Title 1"/>
+          <p:cNvSpPr>
+            <a:spLocks noGrp="1"/>
+          </p:cNvSpPr>
+          <p:nvPr>
+            <p:ph type="title"/>
+          </p:nvPr>
+        </p:nvSpPr>
+        <p:spPr>
+          <a:xfrm>
+            <a:off x="251520" y="548680"/>
+            <a:ext cx="8640960" cy="706090"/>
+          </a:xfrm>
+        </p:spPr>
+        <p:txBody>
+          <a:bodyPr anchor="b"/>
+          <a:lstStyle>
+            <a:lvl1pPr>
+              <a:lnSpc>
+                <a:spcPct val="80000"/>
+              </a:lnSpc>
+              <a:defRPr/>
+            </a:lvl1pPr>
+          </a:lstStyle>
+          <a:p>
+            <a:r>
+              <a:rPr lang="en-US" dirty="0"/>
+              <a:t>Click to edit Master title style</a:t>
+            </a:r>
+            <a:endParaRPr lang="en-GB" dirty="0"/>
+          </a:p>
+        </p:txBody>
+      </p:sp>
+      <p:sp>
+        <p:nvSpPr>
+          <p:cNvPr id="3" name="Content Placeholder 2"/>
+          <p:cNvSpPr>
+            <a:spLocks noGrp="1"/>
+          </p:cNvSpPr>
+          <p:nvPr>
+            <p:ph idx="1"/>
+          </p:nvPr>
+        </p:nvSpPr>
+        <p:spPr>
+          <a:xfrm>
+            <a:off x="251520" y="1600200"/>
+            <a:ext cx="8686800" cy="4572000"/>
+          </a:xfrm>
+          <a:prstGeom prst="rect">
+            <a:avLst/>
+          </a:prstGeom>
+        </p:spPr>
+        <p:txBody>
+          <a:bodyPr/>
+          <a:lstStyle>
+            <a:lvl1pPr marL="0" indent="0">
+              <a:buNone/>
+              <a:defRPr/>
+            </a:lvl1pPr>
+            <a:lvl2pPr marL="457200" indent="0">
+              <a:buNone/>
+              <a:defRPr/>
+            </a:lvl2pPr>
+            <a:lvl3pPr marL="914400" indent="0">
+              <a:buNone/>
+              <a:defRPr/>
+            </a:lvl3pPr>
+            <a:lvl4pPr marL="1371600" indent="0">
+              <a:buNone/>
+              <a:defRPr/>
+            </a:lvl4pPr>
+            <a:lvl5pPr marL="1828800" indent="0">
+              <a:buNone/>
+              <a:defRPr/>
+            </a:lvl5pPr>
+          </a:lstStyle>
+          <a:p>
+            <a:pPr lvl="0"/>
+            <a:r>
+              <a:rPr lang="en-US" dirty="0"/>
+              <a:t>Click to edit Master text styles</a:t>
+            </a:r>
+          </a:p>
+          <a:p>
+            <a:pPr lvl="1"/>
+            <a:r>
+              <a:rPr lang="en-US" dirty="0"/>
+              <a:t>Second level</a:t>
+            </a:r>
+          </a:p>
+          <a:p>
+            <a:pPr lvl="2"/>
+            <a:r>
+              <a:rPr lang="en-US" dirty="0"/>
+              <a:t>Third level</a:t>
+            </a:r>
+          </a:p>
+          <a:p>
+            <a:pPr lvl="3"/>
+            <a:r>
+              <a:rPr lang="en-US" dirty="0"/>
+              <a:t>Fourth level</a:t>
+            </a:r>
+          </a:p>
+          <a:p>
+            <a:pPr lvl="4"/>
+            <a:r>
+              <a:rPr lang="en-US" dirty="0"/>
+              <a:t>Fifth level</a:t>
+            </a:r>
+            <a:endParaRPr lang="en-GB" dirty="0"/>
+          </a:p>
+        </p:txBody>
+      </p:sp>
+      <p:sp>
+        <p:nvSpPr>
+          <p:cNvPr id="4" name="Date Placeholder 3"/>
+          <p:cNvSpPr>
+            <a:spLocks noGrp="1"/>
+          </p:cNvSpPr>
+          <p:nvPr>
+            <p:ph type="dt" sz="half" idx="10"/>
+          </p:nvPr>
+        </p:nvSpPr>
+        <p:spPr>
+          <a:xfrm>
+            <a:off x="251520" y="6356350"/>
+            <a:ext cx="720080" cy="365125"/>
+          </a:xfrm>
+        </p:spPr>
+        <p:txBody>
+          <a:bodyPr/>
+          <a:lstStyle/>
+          <a:p>
+            <a:fld id="{AA0DAA0C-97E8-DA4A-9975-EC4E464C2F40}" type="datetime1">
+              <a:rPr lang="en-US" smtClean="0"/>
+              <a:t>7/21/19</a:t>
+            </a:fld>
+            <a:endParaRPr lang="en-GB"/>
+          </a:p>
+        </p:txBody>
+      </p:sp>
+      <p:sp>
+        <p:nvSpPr>
+          <p:cNvPr id="5" name="Footer Placeholder 4"/>
+          <p:cNvSpPr>
+            <a:spLocks noGrp="1"/>
+          </p:cNvSpPr>
+          <p:nvPr>
+            <p:ph type="ftr" sz="quarter" idx="11"/>
+          </p:nvPr>
+        </p:nvSpPr>
+        <p:spPr>
+          <a:xfrm>
+            <a:off x="1043608" y="6356350"/>
+            <a:ext cx="7056784" cy="365125"/>
+          </a:xfrm>
+        </p:spPr>
+        <p:txBody>
+          <a:bodyPr/>
+          <a:lstStyle>
+            <a:lvl1pPr algn="l">
+              <a:defRPr/>
+            </a:lvl1pPr>
+          </a:lstStyle>
+          <a:p>
+            <a:endParaRPr lang="en-GB" dirty="0"/>
+          </a:p>
+        </p:txBody>
+      </p:sp>
+      <p:sp>
+        <p:nvSpPr>
+          <p:cNvPr id="6" name="Slide Number Placeholder 5"/>
+          <p:cNvSpPr>
+            <a:spLocks noGrp="1"/>
+          </p:cNvSpPr>
+          <p:nvPr>
+            <p:ph type="sldNum" sz="quarter" idx="12"/>
+          </p:nvPr>
+        </p:nvSpPr>
+        <p:spPr>
+          <a:xfrm>
+            <a:off x="8172400" y="6356350"/>
+            <a:ext cx="720080" cy="365125"/>
+          </a:xfrm>
+        </p:spPr>
+        <p:txBody>
+          <a:bodyPr/>
+          <a:lstStyle/>
+          <a:p>
+            <a:fld id="{8DADB20D-508E-4C6D-A9E4-257D5607B0F6}" type="slidenum">
+              <a:rPr lang="en-GB" smtClean="0"/>
+              <a:t>‹#›</a:t>
+            </a:fld>
+            <a:endParaRPr lang="en-GB"/>
+          </a:p>
+        </p:txBody>
+      </p:sp>
+      <p:sp>
+        <p:nvSpPr>
+          <p:cNvPr id="10" name="Content Placeholder 10"/>
+          <p:cNvSpPr>
+            <a:spLocks noGrp="1"/>
+          </p:cNvSpPr>
+          <p:nvPr>
+            <p:ph sz="quarter" idx="13"/>
+          </p:nvPr>
+        </p:nvSpPr>
+        <p:spPr>
+          <a:xfrm>
+            <a:off x="251520" y="1038746"/>
+            <a:ext cx="8640959" cy="360362"/>
+          </a:xfrm>
+          <a:prstGeom prst="rect">
+            <a:avLst/>
+          </a:prstGeom>
+        </p:spPr>
+        <p:txBody>
+          <a:bodyPr anchor="t">
+            <a:noAutofit/>
+          </a:bodyPr>
+          <a:lstStyle>
+            <a:lvl1pPr marL="0" indent="0">
+              <a:buNone/>
+              <a:defRPr sz="2400"/>
+            </a:lvl1pPr>
+            <a:lvl2pPr marL="457200" indent="0">
+              <a:buNone/>
+              <a:defRPr sz="2000"/>
+            </a:lvl2pPr>
+            <a:lvl3pPr marL="914400" indent="0">
+              <a:buNone/>
+              <a:defRPr sz="1800"/>
+            </a:lvl3pPr>
+            <a:lvl4pPr marL="1371600" indent="0">
+              <a:buNone/>
+              <a:defRPr sz="1600"/>
+            </a:lvl4pPr>
+            <a:lvl5pPr marL="1828800" indent="0">
+              <a:buNone/>
+              <a:defRPr sz="1600"/>
+            </a:lvl5pPr>
+          </a:lstStyle>
+          <a:p>
+            <a:pPr lvl="0"/>
+            <a:r>
+              <a:rPr lang="en-US" dirty="0"/>
+              <a:t>Click to edit Master text styles</a:t>
+            </a:r>
+          </a:p>
+          <a:p>
+            <a:pPr lvl="1"/>
+            <a:r>
+              <a:rPr lang="en-US" dirty="0"/>
+              <a:t>Second level</a:t>
+            </a:r>
+          </a:p>
+          <a:p>
+            <a:pPr lvl="2"/>
+            <a:r>
+              <a:rPr lang="en-US" dirty="0"/>
+              <a:t>Third level</a:t>
+            </a:r>
+          </a:p>
+          <a:p>
+            <a:pPr lvl="3"/>
+            <a:r>
+              <a:rPr lang="en-US" dirty="0"/>
+              <a:t>Fourth level</a:t>
+            </a:r>
+          </a:p>
+          <a:p>
+            <a:pPr lvl="4"/>
+            <a:r>
+              <a:rPr lang="en-US" dirty="0"/>
+              <a:t>Fifth level</a:t>
+            </a:r>
+          </a:p>
+        </p:txBody>
+      </p:sp>
+    </p:spTree>
+    <p:extLst>
+      <p:ext uri="{BB962C8B-B14F-4D97-AF65-F5344CB8AC3E}">
+        <p14:creationId xmlns:p14="http://schemas.microsoft.com/office/powerpoint/2010/main" val="41586755"/>
+      </p:ext>
+    </p:extLst>
+  </p:cSld>
+  <p:clrMapOvr>
+    <a:masterClrMapping/>
+  </p:clrMapOvr>
+</p:sldLayout>
+</file>
+
+<file path=ppt/slideLayouts/slideLayout3.xml><?xml version="1.0" encoding="utf-8"?>
 <p:sldLayout xmlns:a="http://schemas.openxmlformats.org/drawingml/2006/main" xmlns:r="http://schemas.openxmlformats.org/officeDocument/2006/relationships" xmlns:p="http://schemas.openxmlformats.org/presentationml/2006/main" preserve="1" userDrawn="1">
   <p:cSld name="content_list">
     <p:spTree>
@@ -1070,321 +1415,6 @@
           </a:xfrm>
         </p:spPr>
         <p:txBody>
-          <a:bodyPr/>
-          <a:lstStyle>
-            <a:lvl1pPr>
-              <a:lnSpc>
-                <a:spcPct val="80000"/>
-              </a:lnSpc>
-              <a:defRPr/>
-            </a:lvl1pPr>
-          </a:lstStyle>
-          <a:p>
-            <a:r>
-              <a:rPr lang="en-US" dirty="0"/>
-              <a:t>Click to edit Master title style</a:t>
-            </a:r>
-            <a:endParaRPr lang="en-GB" dirty="0"/>
-          </a:p>
-        </p:txBody>
-      </p:sp>
-      <p:sp>
-        <p:nvSpPr>
-          <p:cNvPr id="3" name="Content Placeholder 2"/>
-          <p:cNvSpPr>
-            <a:spLocks noGrp="1"/>
-          </p:cNvSpPr>
-          <p:nvPr>
-            <p:ph idx="1"/>
-          </p:nvPr>
-        </p:nvSpPr>
-        <p:spPr>
-          <a:xfrm>
-            <a:off x="251520" y="1600200"/>
-            <a:ext cx="8686800" cy="4572000"/>
-          </a:xfrm>
-        </p:spPr>
-        <p:txBody>
-          <a:bodyPr/>
-          <a:lstStyle/>
-          <a:p>
-            <a:pPr lvl="0"/>
-            <a:r>
-              <a:rPr lang="en-US" dirty="0"/>
-              <a:t>Click to edit Master text styles</a:t>
-            </a:r>
-          </a:p>
-          <a:p>
-            <a:pPr lvl="1"/>
-            <a:r>
-              <a:rPr lang="en-US" dirty="0"/>
-              <a:t>Second level</a:t>
-            </a:r>
-          </a:p>
-          <a:p>
-            <a:pPr lvl="2"/>
-            <a:r>
-              <a:rPr lang="en-US" dirty="0"/>
-              <a:t>Third level</a:t>
-            </a:r>
-          </a:p>
-          <a:p>
-            <a:pPr lvl="3"/>
-            <a:r>
-              <a:rPr lang="en-US" dirty="0"/>
-              <a:t>Fourth level</a:t>
-            </a:r>
-          </a:p>
-          <a:p>
-            <a:pPr lvl="4"/>
-            <a:r>
-              <a:rPr lang="en-US" dirty="0"/>
-              <a:t>Fifth level</a:t>
-            </a:r>
-            <a:endParaRPr lang="en-GB" dirty="0"/>
-          </a:p>
-        </p:txBody>
-      </p:sp>
-      <p:sp>
-        <p:nvSpPr>
-          <p:cNvPr id="4" name="Date Placeholder 3"/>
-          <p:cNvSpPr>
-            <a:spLocks noGrp="1"/>
-          </p:cNvSpPr>
-          <p:nvPr>
-            <p:ph type="dt" sz="half" idx="10"/>
-          </p:nvPr>
-        </p:nvSpPr>
-        <p:spPr>
-          <a:xfrm>
-            <a:off x="251520" y="6356350"/>
-            <a:ext cx="720080" cy="365125"/>
-          </a:xfrm>
-        </p:spPr>
-        <p:txBody>
-          <a:bodyPr/>
-          <a:lstStyle/>
-          <a:p>
-            <a:fld id="{BB662456-9DF9-7F42-9863-03F75BEC0447}" type="datetime1">
-              <a:rPr lang="en-US" smtClean="0"/>
-              <a:t>7/1/19</a:t>
-            </a:fld>
-            <a:endParaRPr lang="en-GB"/>
-          </a:p>
-        </p:txBody>
-      </p:sp>
-      <p:sp>
-        <p:nvSpPr>
-          <p:cNvPr id="5" name="Footer Placeholder 4"/>
-          <p:cNvSpPr>
-            <a:spLocks noGrp="1"/>
-          </p:cNvSpPr>
-          <p:nvPr>
-            <p:ph type="ftr" sz="quarter" idx="11"/>
-          </p:nvPr>
-        </p:nvSpPr>
-        <p:spPr>
-          <a:xfrm>
-            <a:off x="1043608" y="6356350"/>
-            <a:ext cx="7056784" cy="365125"/>
-          </a:xfrm>
-        </p:spPr>
-        <p:txBody>
-          <a:bodyPr/>
-          <a:lstStyle>
-            <a:lvl1pPr algn="l">
-              <a:defRPr/>
-            </a:lvl1pPr>
-          </a:lstStyle>
-          <a:p>
-            <a:endParaRPr lang="en-GB" dirty="0"/>
-          </a:p>
-        </p:txBody>
-      </p:sp>
-      <p:sp>
-        <p:nvSpPr>
-          <p:cNvPr id="6" name="Slide Number Placeholder 5"/>
-          <p:cNvSpPr>
-            <a:spLocks noGrp="1"/>
-          </p:cNvSpPr>
-          <p:nvPr>
-            <p:ph type="sldNum" sz="quarter" idx="12"/>
-          </p:nvPr>
-        </p:nvSpPr>
-        <p:spPr>
-          <a:xfrm>
-            <a:off x="8172400" y="6356350"/>
-            <a:ext cx="720080" cy="365125"/>
-          </a:xfrm>
-        </p:spPr>
-        <p:txBody>
-          <a:bodyPr/>
-          <a:lstStyle/>
-          <a:p>
-            <a:fld id="{8DADB20D-508E-4C6D-A9E4-257D5607B0F6}" type="slidenum">
-              <a:rPr lang="en-GB" smtClean="0"/>
-              <a:t>‹#›</a:t>
-            </a:fld>
-            <a:endParaRPr lang="en-GB"/>
-          </a:p>
-        </p:txBody>
-      </p:sp>
-      <p:sp>
-        <p:nvSpPr>
-          <p:cNvPr id="10" name="Content Placeholder 10"/>
-          <p:cNvSpPr>
-            <a:spLocks noGrp="1"/>
-          </p:cNvSpPr>
-          <p:nvPr>
-            <p:ph sz="quarter" idx="13"/>
-          </p:nvPr>
-        </p:nvSpPr>
-        <p:spPr>
-          <a:xfrm>
-            <a:off x="251520" y="1038746"/>
-            <a:ext cx="8640959" cy="360362"/>
-          </a:xfrm>
-        </p:spPr>
-        <p:txBody>
-          <a:bodyPr>
-            <a:noAutofit/>
-          </a:bodyPr>
-          <a:lstStyle>
-            <a:lvl1pPr marL="0" indent="0">
-              <a:buNone/>
-              <a:defRPr sz="2400"/>
-            </a:lvl1pPr>
-            <a:lvl2pPr marL="457200" indent="0">
-              <a:buNone/>
-              <a:defRPr sz="2000"/>
-            </a:lvl2pPr>
-            <a:lvl3pPr marL="914400" indent="0">
-              <a:buNone/>
-              <a:defRPr sz="1800"/>
-            </a:lvl3pPr>
-            <a:lvl4pPr marL="1371600" indent="0">
-              <a:buNone/>
-              <a:defRPr sz="1600"/>
-            </a:lvl4pPr>
-            <a:lvl5pPr marL="1828800" indent="0">
-              <a:buNone/>
-              <a:defRPr sz="1600"/>
-            </a:lvl5pPr>
-          </a:lstStyle>
-          <a:p>
-            <a:pPr lvl="0"/>
-            <a:r>
-              <a:rPr lang="en-US" dirty="0"/>
-              <a:t>Click to edit Master text styles</a:t>
-            </a:r>
-          </a:p>
-          <a:p>
-            <a:pPr lvl="1"/>
-            <a:r>
-              <a:rPr lang="en-US" dirty="0"/>
-              <a:t>Second level</a:t>
-            </a:r>
-          </a:p>
-          <a:p>
-            <a:pPr lvl="2"/>
-            <a:r>
-              <a:rPr lang="en-US" dirty="0"/>
-              <a:t>Third level</a:t>
-            </a:r>
-          </a:p>
-          <a:p>
-            <a:pPr lvl="3"/>
-            <a:r>
-              <a:rPr lang="en-US" dirty="0"/>
-              <a:t>Fourth level</a:t>
-            </a:r>
-          </a:p>
-          <a:p>
-            <a:pPr lvl="4"/>
-            <a:r>
-              <a:rPr lang="en-US" dirty="0"/>
-              <a:t>Fifth level</a:t>
-            </a:r>
-          </a:p>
-        </p:txBody>
-      </p:sp>
-    </p:spTree>
-    <p:extLst>
-      <p:ext uri="{BB962C8B-B14F-4D97-AF65-F5344CB8AC3E}">
-        <p14:creationId xmlns:p14="http://schemas.microsoft.com/office/powerpoint/2010/main" val="271576982"/>
-      </p:ext>
-    </p:extLst>
-  </p:cSld>
-  <p:clrMapOvr>
-    <a:masterClrMapping/>
-  </p:clrMapOvr>
-</p:sldLayout>
-</file>
-
-<file path=ppt/slideLayouts/slideLayout3.xml><?xml version="1.0" encoding="utf-8"?>
-<p:sldLayout xmlns:a="http://schemas.openxmlformats.org/drawingml/2006/main" xmlns:r="http://schemas.openxmlformats.org/officeDocument/2006/relationships" xmlns:p="http://schemas.openxmlformats.org/presentationml/2006/main" preserve="1" userDrawn="1">
-  <p:cSld name="content_text">
-    <p:spTree>
-      <p:nvGrpSpPr>
-        <p:cNvPr id="1" name=""/>
-        <p:cNvGrpSpPr/>
-        <p:nvPr/>
-      </p:nvGrpSpPr>
-      <p:grpSpPr>
-        <a:xfrm>
-          <a:off x="0" y="0"/>
-          <a:ext cx="0" cy="0"/>
-          <a:chOff x="0" y="0"/>
-          <a:chExt cx="0" cy="0"/>
-        </a:xfrm>
-      </p:grpSpPr>
-      <p:pic>
-        <p:nvPicPr>
-          <p:cNvPr id="9" name="Picture 8" descr="slide_background_tall.png"/>
-          <p:cNvPicPr>
-            <a:picLocks noChangeAspect="1"/>
-          </p:cNvPicPr>
-          <p:nvPr userDrawn="1"/>
-        </p:nvPicPr>
-        <p:blipFill>
-          <a:blip r:embed="rId2">
-            <a:extLst>
-              <a:ext uri="{28A0092B-C50C-407E-A947-70E740481C1C}">
-                <a14:useLocalDpi xmlns:a14="http://schemas.microsoft.com/office/drawing/2010/main" val="0"/>
-              </a:ext>
-            </a:extLst>
-          </a:blip>
-          <a:stretch>
-            <a:fillRect/>
-          </a:stretch>
-        </p:blipFill>
-        <p:spPr>
-          <a:xfrm>
-            <a:off x="0" y="-27384"/>
-            <a:ext cx="9144000" cy="1493881"/>
-          </a:xfrm>
-          <a:prstGeom prst="rect">
-            <a:avLst/>
-          </a:prstGeom>
-        </p:spPr>
-      </p:pic>
-      <p:sp>
-        <p:nvSpPr>
-          <p:cNvPr id="2" name="Title 1"/>
-          <p:cNvSpPr>
-            <a:spLocks noGrp="1"/>
-          </p:cNvSpPr>
-          <p:nvPr>
-            <p:ph type="title"/>
-          </p:nvPr>
-        </p:nvSpPr>
-        <p:spPr>
-          <a:xfrm>
-            <a:off x="251520" y="548680"/>
-            <a:ext cx="8640960" cy="706090"/>
-          </a:xfrm>
-        </p:spPr>
-        <p:txBody>
           <a:bodyPr anchor="b"/>
           <a:lstStyle>
             <a:lvl1pPr>
@@ -1418,28 +1448,36 @@
             <a:off x="251520" y="1600200"/>
             <a:ext cx="8686800" cy="4572000"/>
           </a:xfrm>
+          <a:prstGeom prst="rect">
+            <a:avLst/>
+          </a:prstGeom>
         </p:spPr>
         <p:txBody>
           <a:bodyPr/>
           <a:lstStyle>
-            <a:lvl1pPr marL="0" indent="0">
-              <a:buNone/>
+            <a:lvl1pPr marL="457200" indent="-457200">
+              <a:buFont typeface="Arial" panose="020B0604020202020204" pitchFamily="34" charset="0"/>
+              <a:buChar char="•"/>
               <a:defRPr/>
             </a:lvl1pPr>
-            <a:lvl2pPr marL="457200" indent="0">
-              <a:buNone/>
+            <a:lvl2pPr marL="914400" indent="-457200">
+              <a:buFont typeface="Arial" panose="020B0604020202020204" pitchFamily="34" charset="0"/>
+              <a:buChar char="•"/>
               <a:defRPr/>
             </a:lvl2pPr>
-            <a:lvl3pPr marL="914400" indent="0">
-              <a:buNone/>
+            <a:lvl3pPr marL="1257300" indent="-342900">
+              <a:buFont typeface="Arial" panose="020B0604020202020204" pitchFamily="34" charset="0"/>
+              <a:buChar char="•"/>
               <a:defRPr/>
             </a:lvl3pPr>
-            <a:lvl4pPr marL="1371600" indent="0">
-              <a:buNone/>
+            <a:lvl4pPr marL="1714500" indent="-342900">
+              <a:buFont typeface="Arial" panose="020B0604020202020204" pitchFamily="34" charset="0"/>
+              <a:buChar char="•"/>
               <a:defRPr/>
             </a:lvl4pPr>
-            <a:lvl5pPr marL="1828800" indent="0">
-              <a:buNone/>
+            <a:lvl5pPr marL="2171700" indent="-342900">
+              <a:buFont typeface="Arial" panose="020B0604020202020204" pitchFamily="34" charset="0"/>
+              <a:buChar char="•"/>
               <a:defRPr/>
             </a:lvl5pPr>
           </a:lstStyle>
@@ -1503,7 +1541,7 @@
           <a:p>
             <a:fld id="{AA0DAA0C-97E8-DA4A-9975-EC4E464C2F40}" type="datetime1">
               <a:rPr lang="en-US" smtClean="0"/>
-              <a:t>7/1/19</a:t>
+              <a:t>7/21/19</a:t>
             </a:fld>
             <a:endParaRPr lang="en-GB"/>
           </a:p>
@@ -1580,6 +1618,9 @@
             <a:off x="251520" y="1038746"/>
             <a:ext cx="8640959" cy="360362"/>
           </a:xfrm>
+          <a:prstGeom prst="rect">
+            <a:avLst/>
+          </a:prstGeom>
         </p:spPr>
         <p:txBody>
           <a:bodyPr anchor="t">
@@ -1647,7 +1688,7 @@
     </p:spTree>
     <p:extLst>
       <p:ext uri="{BB962C8B-B14F-4D97-AF65-F5344CB8AC3E}">
-        <p14:creationId xmlns:p14="http://schemas.microsoft.com/office/powerpoint/2010/main" val="41586755"/>
+        <p14:creationId xmlns:p14="http://schemas.microsoft.com/office/powerpoint/2010/main" val="2947031213"/>
       </p:ext>
     </p:extLst>
   </p:cSld>
@@ -1721,6 +1762,9 @@
             <a:off x="685800" y="1254125"/>
             <a:ext cx="7772400" cy="1752600"/>
           </a:xfrm>
+          <a:prstGeom prst="rect">
+            <a:avLst/>
+          </a:prstGeom>
         </p:spPr>
         <p:txBody>
           <a:bodyPr anchor="b">
@@ -2007,6 +2051,9 @@
             <a:off x="251520" y="2204864"/>
             <a:ext cx="4244280" cy="4032448"/>
           </a:xfrm>
+          <a:prstGeom prst="rect">
+            <a:avLst/>
+          </a:prstGeom>
         </p:spPr>
         <p:txBody>
           <a:bodyPr/>
@@ -2092,6 +2139,9 @@
             <a:off x="4648200" y="2204864"/>
             <a:ext cx="4244280" cy="4032448"/>
           </a:xfrm>
+          <a:prstGeom prst="rect">
+            <a:avLst/>
+          </a:prstGeom>
         </p:spPr>
         <p:txBody>
           <a:bodyPr/>
@@ -2184,7 +2234,7 @@
           <a:p>
             <a:fld id="{04A76F9C-33B6-4248-95F4-E755A51BE64F}" type="datetime1">
               <a:rPr lang="en-US" smtClean="0"/>
-              <a:t>7/1/19</a:t>
+              <a:t>7/21/19</a:t>
             </a:fld>
             <a:endParaRPr lang="en-GB"/>
           </a:p>
@@ -2261,6 +2311,9 @@
             <a:off x="251521" y="1038424"/>
             <a:ext cx="8640960" cy="360362"/>
           </a:xfrm>
+          <a:prstGeom prst="rect">
+            <a:avLst/>
+          </a:prstGeom>
         </p:spPr>
         <p:txBody>
           <a:bodyPr>
@@ -2340,6 +2393,9 @@
             <a:off x="251520" y="1535113"/>
             <a:ext cx="4245868" cy="639762"/>
           </a:xfrm>
+          <a:prstGeom prst="rect">
+            <a:avLst/>
+          </a:prstGeom>
         </p:spPr>
         <p:txBody>
           <a:bodyPr anchor="b"/>
@@ -2405,6 +2461,9 @@
             <a:off x="4645025" y="1535113"/>
             <a:ext cx="4247455" cy="639762"/>
           </a:xfrm>
+          <a:prstGeom prst="rect">
+            <a:avLst/>
+          </a:prstGeom>
         </p:spPr>
         <p:txBody>
           <a:bodyPr anchor="b"/>
@@ -2565,6 +2624,9 @@
             <a:off x="251520" y="2204864"/>
             <a:ext cx="4244280" cy="4032448"/>
           </a:xfrm>
+          <a:prstGeom prst="rect">
+            <a:avLst/>
+          </a:prstGeom>
         </p:spPr>
         <p:txBody>
           <a:bodyPr>
@@ -2657,6 +2719,9 @@
             <a:off x="4648200" y="2204864"/>
             <a:ext cx="4244280" cy="4032448"/>
           </a:xfrm>
+          <a:prstGeom prst="rect">
+            <a:avLst/>
+          </a:prstGeom>
         </p:spPr>
         <p:txBody>
           <a:bodyPr>
@@ -2756,7 +2821,7 @@
           <a:p>
             <a:fld id="{7BA53915-059E-FD4B-A198-BD5AD9F97206}" type="datetime1">
               <a:rPr lang="en-US" smtClean="0"/>
-              <a:t>7/1/19</a:t>
+              <a:t>7/21/19</a:t>
             </a:fld>
             <a:endParaRPr lang="en-GB"/>
           </a:p>
@@ -2833,6 +2898,9 @@
             <a:off x="251521" y="1038424"/>
             <a:ext cx="8640960" cy="360362"/>
           </a:xfrm>
+          <a:prstGeom prst="rect">
+            <a:avLst/>
+          </a:prstGeom>
         </p:spPr>
         <p:txBody>
           <a:bodyPr>
@@ -2912,6 +2980,9 @@
             <a:off x="251520" y="1535113"/>
             <a:ext cx="4245868" cy="639762"/>
           </a:xfrm>
+          <a:prstGeom prst="rect">
+            <a:avLst/>
+          </a:prstGeom>
         </p:spPr>
         <p:txBody>
           <a:bodyPr anchor="b"/>
@@ -2977,6 +3048,9 @@
             <a:off x="4645025" y="1535113"/>
             <a:ext cx="4247455" cy="639762"/>
           </a:xfrm>
+          <a:prstGeom prst="rect">
+            <a:avLst/>
+          </a:prstGeom>
         </p:spPr>
         <p:txBody>
           <a:bodyPr anchor="b"/>
@@ -3137,6 +3211,9 @@
             <a:off x="251520" y="1600200"/>
             <a:ext cx="4261104" cy="4572000"/>
           </a:xfrm>
+          <a:prstGeom prst="rect">
+            <a:avLst/>
+          </a:prstGeom>
         </p:spPr>
         <p:txBody>
           <a:bodyPr>
@@ -3224,6 +3301,9 @@
             <a:off x="4648200" y="1600200"/>
             <a:ext cx="4251960" cy="4572000"/>
           </a:xfrm>
+          <a:prstGeom prst="rect">
+            <a:avLst/>
+          </a:prstGeom>
         </p:spPr>
         <p:txBody>
           <a:bodyPr>
@@ -3318,7 +3398,7 @@
           <a:p>
             <a:fld id="{F7C6CE28-510F-5240-BB2D-5CAA84033ED0}" type="datetime1">
               <a:rPr lang="en-US" smtClean="0"/>
-              <a:t>7/1/19</a:t>
+              <a:t>7/21/19</a:t>
             </a:fld>
             <a:endParaRPr lang="en-GB"/>
           </a:p>
@@ -3395,6 +3475,9 @@
             <a:off x="251520" y="1038424"/>
             <a:ext cx="8640959" cy="360362"/>
           </a:xfrm>
+          <a:prstGeom prst="rect">
+            <a:avLst/>
+          </a:prstGeom>
         </p:spPr>
         <p:txBody>
           <a:bodyPr>
@@ -3569,6 +3652,9 @@
             <a:off x="251520" y="1600200"/>
             <a:ext cx="4244280" cy="4637112"/>
           </a:xfrm>
+          <a:prstGeom prst="rect">
+            <a:avLst/>
+          </a:prstGeom>
         </p:spPr>
         <p:txBody>
           <a:bodyPr>
@@ -3661,6 +3747,9 @@
             <a:off x="4648200" y="1600200"/>
             <a:ext cx="4244280" cy="4637112"/>
           </a:xfrm>
+          <a:prstGeom prst="rect">
+            <a:avLst/>
+          </a:prstGeom>
         </p:spPr>
         <p:txBody>
           <a:bodyPr>
@@ -3760,7 +3849,7 @@
           <a:p>
             <a:fld id="{DC8473B6-9DB1-6841-865B-A1275004FC4D}" type="datetime1">
               <a:rPr lang="en-US" smtClean="0"/>
-              <a:t>7/1/19</a:t>
+              <a:t>7/21/19</a:t>
             </a:fld>
             <a:endParaRPr lang="en-GB"/>
           </a:p>
@@ -3837,6 +3926,9 @@
             <a:off x="251520" y="1038424"/>
             <a:ext cx="8640959" cy="360362"/>
           </a:xfrm>
+          <a:prstGeom prst="rect">
+            <a:avLst/>
+          </a:prstGeom>
         </p:spPr>
         <p:txBody>
           <a:bodyPr>
@@ -4013,7 +4105,7 @@
           <a:p>
             <a:fld id="{D871C1FE-9025-5C49-BA5C-C24D6151D8FF}" type="datetime1">
               <a:rPr lang="en-US" smtClean="0"/>
-              <a:t>7/1/19</a:t>
+              <a:t>7/21/19</a:t>
             </a:fld>
             <a:endParaRPr lang="en-GB"/>
           </a:p>
@@ -4240,7 +4332,7 @@
           <a:p>
             <a:fld id="{13B1BC43-4B43-954F-8BAE-86993A84B7B7}" type="datetime1">
               <a:rPr lang="en-US" smtClean="0"/>
-              <a:t>7/1/19</a:t>
+              <a:t>7/21/19</a:t>
             </a:fld>
             <a:endParaRPr lang="en-GB" dirty="0"/>
           </a:p>
@@ -4334,8 +4426,8 @@
   <p:clrMap bg1="lt1" tx1="dk1" bg2="lt2" tx2="dk2" accent1="accent1" accent2="accent2" accent3="accent3" accent4="accent4" accent5="accent5" accent6="accent6" hlink="hlink" folHlink="folHlink"/>
   <p:sldLayoutIdLst>
     <p:sldLayoutId id="2147483649" r:id="rId1"/>
-    <p:sldLayoutId id="2147483650" r:id="rId2"/>
-    <p:sldLayoutId id="2147483656" r:id="rId3"/>
+    <p:sldLayoutId id="2147483656" r:id="rId2"/>
+    <p:sldLayoutId id="2147483661" r:id="rId3"/>
     <p:sldLayoutId id="2147483660" r:id="rId4"/>
     <p:sldLayoutId id="2147483652" r:id="rId5"/>
     <p:sldLayoutId id="2147483658" r:id="rId6"/>

</xml_diff>

<commit_message>
Cleaned up some of the reporting code and fixed some random bugs
</commit_message>
<xml_diff>
--- a/inst/ubinc/templates/report.pptx
+++ b/inst/ubinc/templates/report.pptx
@@ -211,7 +211,7 @@
           <a:p>
             <a:fld id="{1B656253-81D4-504C-9F22-C43A5586B7F8}" type="datetimeFigureOut">
               <a:rPr lang="en-US" smtClean="0"/>
-              <a:t>7/21/19</a:t>
+              <a:t>12/27/20</a:t>
             </a:fld>
             <a:endParaRPr lang="en-US"/>
           </a:p>
@@ -377,7 +377,7 @@
           <a:p>
             <a:fld id="{EEA38B4D-A065-A048-981C-DE16882AB0B1}" type="datetimeFigureOut">
               <a:rPr lang="en-US" smtClean="0"/>
-              <a:t>7/21/19</a:t>
+              <a:t>12/27/20</a:t>
             </a:fld>
             <a:endParaRPr lang="en-US"/>
           </a:p>
@@ -934,7 +934,7 @@
           <a:p>
             <a:fld id="{52BA1850-337E-7747-91FB-64B4051995E4}" type="datetime1">
               <a:rPr lang="en-US" smtClean="0"/>
-              <a:t>7/21/19</a:t>
+              <a:t>12/27/20</a:t>
             </a:fld>
             <a:endParaRPr lang="en-GB"/>
           </a:p>
@@ -1194,7 +1194,7 @@
           <a:p>
             <a:fld id="{AA0DAA0C-97E8-DA4A-9975-EC4E464C2F40}" type="datetime1">
               <a:rPr lang="en-US" smtClean="0"/>
-              <a:t>7/21/19</a:t>
+              <a:t>12/27/20</a:t>
             </a:fld>
             <a:endParaRPr lang="en-GB"/>
           </a:p>
@@ -1541,7 +1541,7 @@
           <a:p>
             <a:fld id="{AA0DAA0C-97E8-DA4A-9975-EC4E464C2F40}" type="datetime1">
               <a:rPr lang="en-US" smtClean="0"/>
-              <a:t>7/21/19</a:t>
+              <a:t>12/27/20</a:t>
             </a:fld>
             <a:endParaRPr lang="en-GB"/>
           </a:p>
@@ -2234,7 +2234,7 @@
           <a:p>
             <a:fld id="{04A76F9C-33B6-4248-95F4-E755A51BE64F}" type="datetime1">
               <a:rPr lang="en-US" smtClean="0"/>
-              <a:t>7/21/19</a:t>
+              <a:t>12/27/20</a:t>
             </a:fld>
             <a:endParaRPr lang="en-GB"/>
           </a:p>
@@ -2821,7 +2821,7 @@
           <a:p>
             <a:fld id="{7BA53915-059E-FD4B-A198-BD5AD9F97206}" type="datetime1">
               <a:rPr lang="en-US" smtClean="0"/>
-              <a:t>7/21/19</a:t>
+              <a:t>12/27/20</a:t>
             </a:fld>
             <a:endParaRPr lang="en-GB"/>
           </a:p>
@@ -2967,18 +2967,24 @@
       </p:sp>
       <p:sp>
         <p:nvSpPr>
-          <p:cNvPr id="11" name="Text Placeholder 2"/>
-          <p:cNvSpPr>
-            <a:spLocks noGrp="1"/>
-          </p:cNvSpPr>
-          <p:nvPr>
-            <p:ph type="body" idx="14"/>
-          </p:nvPr>
-        </p:nvSpPr>
-        <p:spPr>
-          <a:xfrm>
-            <a:off x="251520" y="1535113"/>
-            <a:ext cx="4245868" cy="639762"/>
+          <p:cNvPr id="13" name="Text Placeholder 4">
+            <a:extLst>
+              <a:ext uri="{FF2B5EF4-FFF2-40B4-BE49-F238E27FC236}">
+                <a16:creationId xmlns:a16="http://schemas.microsoft.com/office/drawing/2014/main" id="{7B3A2247-8042-084E-8974-524A230C9582}"/>
+              </a:ext>
+            </a:extLst>
+          </p:cNvPr>
+          <p:cNvSpPr>
+            <a:spLocks noGrp="1"/>
+          </p:cNvSpPr>
+          <p:nvPr>
+            <p:ph type="body" sz="quarter" idx="15"/>
+          </p:nvPr>
+        </p:nvSpPr>
+        <p:spPr>
+          <a:xfrm>
+            <a:off x="4645025" y="1484784"/>
+            <a:ext cx="4247455" cy="639762"/>
           </a:xfrm>
           <a:prstGeom prst="rect">
             <a:avLst/>
@@ -3035,18 +3041,24 @@
       </p:sp>
       <p:sp>
         <p:nvSpPr>
-          <p:cNvPr id="12" name="Text Placeholder 4"/>
-          <p:cNvSpPr>
-            <a:spLocks noGrp="1"/>
-          </p:cNvSpPr>
-          <p:nvPr>
-            <p:ph type="body" sz="quarter" idx="3"/>
-          </p:nvPr>
-        </p:nvSpPr>
-        <p:spPr>
-          <a:xfrm>
-            <a:off x="4645025" y="1535113"/>
-            <a:ext cx="4247455" cy="639762"/>
+          <p:cNvPr id="14" name="Text Placeholder 2">
+            <a:extLst>
+              <a:ext uri="{FF2B5EF4-FFF2-40B4-BE49-F238E27FC236}">
+                <a16:creationId xmlns:a16="http://schemas.microsoft.com/office/drawing/2014/main" id="{3749FA58-F2E5-B949-919F-958B0C335830}"/>
+              </a:ext>
+            </a:extLst>
+          </p:cNvPr>
+          <p:cNvSpPr>
+            <a:spLocks noGrp="1"/>
+          </p:cNvSpPr>
+          <p:nvPr>
+            <p:ph type="body" idx="16"/>
+          </p:nvPr>
+        </p:nvSpPr>
+        <p:spPr>
+          <a:xfrm>
+            <a:off x="251520" y="1505583"/>
+            <a:ext cx="4245868" cy="639762"/>
           </a:xfrm>
           <a:prstGeom prst="rect">
             <a:avLst/>
@@ -3398,7 +3410,7 @@
           <a:p>
             <a:fld id="{F7C6CE28-510F-5240-BB2D-5CAA84033ED0}" type="datetime1">
               <a:rPr lang="en-US" smtClean="0"/>
-              <a:t>7/21/19</a:t>
+              <a:t>12/27/20</a:t>
             </a:fld>
             <a:endParaRPr lang="en-GB"/>
           </a:p>
@@ -3849,7 +3861,7 @@
           <a:p>
             <a:fld id="{DC8473B6-9DB1-6841-865B-A1275004FC4D}" type="datetime1">
               <a:rPr lang="en-US" smtClean="0"/>
-              <a:t>7/21/19</a:t>
+              <a:t>12/27/20</a:t>
             </a:fld>
             <a:endParaRPr lang="en-GB"/>
           </a:p>
@@ -4105,7 +4117,7 @@
           <a:p>
             <a:fld id="{D871C1FE-9025-5C49-BA5C-C24D6151D8FF}" type="datetime1">
               <a:rPr lang="en-US" smtClean="0"/>
-              <a:t>7/21/19</a:t>
+              <a:t>12/27/20</a:t>
             </a:fld>
             <a:endParaRPr lang="en-GB"/>
           </a:p>
@@ -4332,7 +4344,7 @@
           <a:p>
             <a:fld id="{13B1BC43-4B43-954F-8BAE-86993A84B7B7}" type="datetime1">
               <a:rPr lang="en-US" smtClean="0"/>
-              <a:t>7/21/19</a:t>
+              <a:t>12/27/20</a:t>
             </a:fld>
             <a:endParaRPr lang="en-GB" dirty="0"/>
           </a:p>

</xml_diff>

<commit_message>
Added sessionInfo() to estimation Word reporting
</commit_message>
<xml_diff>
--- a/inst/ubinc/templates/report.pptx
+++ b/inst/ubinc/templates/report.pptx
@@ -897,6 +897,180 @@
 
 <file path=ppt/slideLayouts/slideLayout10.xml><?xml version="1.0" encoding="utf-8"?>
 <p:sldLayout xmlns:a="http://schemas.openxmlformats.org/drawingml/2006/main" xmlns:r="http://schemas.openxmlformats.org/officeDocument/2006/relationships" xmlns:p="http://schemas.openxmlformats.org/presentationml/2006/main" preserve="1" userDrawn="1">
+  <p:cSld name="title_only">
+    <p:spTree>
+      <p:nvGrpSpPr>
+        <p:cNvPr id="1" name=""/>
+        <p:cNvGrpSpPr/>
+        <p:nvPr/>
+      </p:nvGrpSpPr>
+      <p:grpSpPr>
+        <a:xfrm>
+          <a:off x="0" y="0"/>
+          <a:ext cx="0" cy="0"/>
+          <a:chOff x="0" y="0"/>
+          <a:chExt cx="0" cy="0"/>
+        </a:xfrm>
+      </p:grpSpPr>
+      <p:pic>
+        <p:nvPicPr>
+          <p:cNvPr id="6" name="Picture 5" descr="slide_background_tall.png"/>
+          <p:cNvPicPr>
+            <a:picLocks noChangeAspect="1"/>
+          </p:cNvPicPr>
+          <p:nvPr userDrawn="1"/>
+        </p:nvPicPr>
+        <p:blipFill>
+          <a:blip r:embed="rId2">
+            <a:extLst>
+              <a:ext uri="{28A0092B-C50C-407E-A947-70E740481C1C}">
+                <a14:useLocalDpi xmlns:a14="http://schemas.microsoft.com/office/drawing/2010/main" val="0"/>
+              </a:ext>
+            </a:extLst>
+          </a:blip>
+          <a:stretch>
+            <a:fillRect/>
+          </a:stretch>
+        </p:blipFill>
+        <p:spPr>
+          <a:xfrm>
+            <a:off x="0" y="-27384"/>
+            <a:ext cx="9144000" cy="1493881"/>
+          </a:xfrm>
+          <a:prstGeom prst="rect">
+            <a:avLst/>
+          </a:prstGeom>
+        </p:spPr>
+      </p:pic>
+      <p:sp>
+        <p:nvSpPr>
+          <p:cNvPr id="2" name="Title 1"/>
+          <p:cNvSpPr>
+            <a:spLocks noGrp="1"/>
+          </p:cNvSpPr>
+          <p:nvPr>
+            <p:ph type="title"/>
+          </p:nvPr>
+        </p:nvSpPr>
+        <p:spPr/>
+        <p:txBody>
+          <a:bodyPr/>
+          <a:lstStyle>
+            <a:lvl1pPr>
+              <a:lnSpc>
+                <a:spcPct val="80000"/>
+              </a:lnSpc>
+              <a:defRPr/>
+            </a:lvl1pPr>
+          </a:lstStyle>
+          <a:p>
+            <a:r>
+              <a:rPr lang="en-US" dirty="0"/>
+              <a:t>Click to edit Master title style</a:t>
+            </a:r>
+            <a:endParaRPr lang="en-GB" dirty="0"/>
+          </a:p>
+        </p:txBody>
+      </p:sp>
+      <p:sp>
+        <p:nvSpPr>
+          <p:cNvPr id="3" name="Date Placeholder 2"/>
+          <p:cNvSpPr>
+            <a:spLocks noGrp="1"/>
+          </p:cNvSpPr>
+          <p:nvPr>
+            <p:ph type="dt" sz="half" idx="10"/>
+          </p:nvPr>
+        </p:nvSpPr>
+        <p:spPr>
+          <a:xfrm>
+            <a:off x="251520" y="6356350"/>
+            <a:ext cx="720080" cy="365125"/>
+          </a:xfrm>
+        </p:spPr>
+        <p:txBody>
+          <a:bodyPr/>
+          <a:lstStyle/>
+          <a:p>
+            <a:fld id="{D871C1FE-9025-5C49-BA5C-C24D6151D8FF}" type="datetime1">
+              <a:rPr lang="en-US" smtClean="0"/>
+              <a:t>12/27/20</a:t>
+            </a:fld>
+            <a:endParaRPr lang="en-GB"/>
+          </a:p>
+        </p:txBody>
+      </p:sp>
+      <p:sp>
+        <p:nvSpPr>
+          <p:cNvPr id="4" name="Footer Placeholder 3"/>
+          <p:cNvSpPr>
+            <a:spLocks noGrp="1"/>
+          </p:cNvSpPr>
+          <p:nvPr>
+            <p:ph type="ftr" sz="quarter" idx="11"/>
+          </p:nvPr>
+        </p:nvSpPr>
+        <p:spPr>
+          <a:xfrm>
+            <a:off x="1043608" y="6356350"/>
+            <a:ext cx="7056784" cy="365125"/>
+          </a:xfrm>
+        </p:spPr>
+        <p:txBody>
+          <a:bodyPr/>
+          <a:lstStyle>
+            <a:lvl1pPr algn="l">
+              <a:defRPr/>
+            </a:lvl1pPr>
+          </a:lstStyle>
+          <a:p>
+            <a:endParaRPr lang="en-GB" dirty="0"/>
+          </a:p>
+        </p:txBody>
+      </p:sp>
+      <p:sp>
+        <p:nvSpPr>
+          <p:cNvPr id="5" name="Slide Number Placeholder 4"/>
+          <p:cNvSpPr>
+            <a:spLocks noGrp="1"/>
+          </p:cNvSpPr>
+          <p:nvPr>
+            <p:ph type="sldNum" sz="quarter" idx="12"/>
+          </p:nvPr>
+        </p:nvSpPr>
+        <p:spPr>
+          <a:xfrm>
+            <a:off x="8172400" y="6356350"/>
+            <a:ext cx="720080" cy="365125"/>
+          </a:xfrm>
+        </p:spPr>
+        <p:txBody>
+          <a:bodyPr/>
+          <a:lstStyle/>
+          <a:p>
+            <a:fld id="{8DADB20D-508E-4C6D-A9E4-257D5607B0F6}" type="slidenum">
+              <a:rPr lang="en-GB" smtClean="0"/>
+              <a:t>‹#›</a:t>
+            </a:fld>
+            <a:endParaRPr lang="en-GB"/>
+          </a:p>
+        </p:txBody>
+      </p:sp>
+    </p:spTree>
+    <p:extLst>
+      <p:ext uri="{BB962C8B-B14F-4D97-AF65-F5344CB8AC3E}">
+        <p14:creationId xmlns:p14="http://schemas.microsoft.com/office/powerpoint/2010/main" val="1385807973"/>
+      </p:ext>
+    </p:extLst>
+  </p:cSld>
+  <p:clrMapOvr>
+    <a:masterClrMapping/>
+  </p:clrMapOvr>
+</p:sldLayout>
+</file>
+
+<file path=ppt/slideLayouts/slideLayout11.xml><?xml version="1.0" encoding="utf-8"?>
+<p:sldLayout xmlns:a="http://schemas.openxmlformats.org/drawingml/2006/main" xmlns:r="http://schemas.openxmlformats.org/officeDocument/2006/relationships" xmlns:p="http://schemas.openxmlformats.org/presentationml/2006/main" preserve="1" userDrawn="1">
   <p:cSld name="blank">
     <p:spTree>
       <p:nvGrpSpPr>
@@ -2629,6 +2803,589 @@
           </a:prstGeom>
         </p:spPr>
         <p:txBody>
+          <a:bodyPr/>
+          <a:lstStyle>
+            <a:lvl1pPr>
+              <a:buNone/>
+              <a:defRPr sz="2800"/>
+            </a:lvl1pPr>
+            <a:lvl2pPr>
+              <a:buNone/>
+              <a:defRPr sz="2400"/>
+            </a:lvl2pPr>
+            <a:lvl3pPr>
+              <a:buNone/>
+              <a:defRPr sz="2000"/>
+            </a:lvl3pPr>
+            <a:lvl4pPr>
+              <a:buNone/>
+              <a:defRPr sz="1800"/>
+            </a:lvl4pPr>
+            <a:lvl5pPr>
+              <a:buNone/>
+              <a:defRPr sz="1800"/>
+            </a:lvl5pPr>
+            <a:lvl6pPr>
+              <a:defRPr sz="1800"/>
+            </a:lvl6pPr>
+            <a:lvl7pPr>
+              <a:defRPr sz="1800"/>
+            </a:lvl7pPr>
+            <a:lvl8pPr>
+              <a:defRPr sz="1800"/>
+            </a:lvl8pPr>
+            <a:lvl9pPr>
+              <a:defRPr sz="1800"/>
+            </a:lvl9pPr>
+          </a:lstStyle>
+          <a:p>
+            <a:pPr lvl="0"/>
+            <a:r>
+              <a:rPr lang="en-US"/>
+              <a:t>Click to edit Master text styles</a:t>
+            </a:r>
+          </a:p>
+          <a:p>
+            <a:pPr lvl="1"/>
+            <a:r>
+              <a:rPr lang="en-US"/>
+              <a:t>Second level</a:t>
+            </a:r>
+          </a:p>
+          <a:p>
+            <a:pPr lvl="2"/>
+            <a:r>
+              <a:rPr lang="en-US"/>
+              <a:t>Third level</a:t>
+            </a:r>
+          </a:p>
+          <a:p>
+            <a:pPr lvl="3"/>
+            <a:r>
+              <a:rPr lang="en-US"/>
+              <a:t>Fourth level</a:t>
+            </a:r>
+          </a:p>
+          <a:p>
+            <a:pPr lvl="4"/>
+            <a:r>
+              <a:rPr lang="en-US"/>
+              <a:t>Fifth level</a:t>
+            </a:r>
+            <a:endParaRPr lang="en-GB"/>
+          </a:p>
+        </p:txBody>
+      </p:sp>
+      <p:sp>
+        <p:nvSpPr>
+          <p:cNvPr id="4" name="Content Placeholder 3"/>
+          <p:cNvSpPr>
+            <a:spLocks noGrp="1"/>
+          </p:cNvSpPr>
+          <p:nvPr>
+            <p:ph sz="half" idx="2"/>
+          </p:nvPr>
+        </p:nvSpPr>
+        <p:spPr>
+          <a:xfrm>
+            <a:off x="4648200" y="2204864"/>
+            <a:ext cx="4244280" cy="4032448"/>
+          </a:xfrm>
+          <a:prstGeom prst="rect">
+            <a:avLst/>
+          </a:prstGeom>
+        </p:spPr>
+        <p:txBody>
+          <a:bodyPr/>
+          <a:lstStyle>
+            <a:lvl1pPr>
+              <a:buNone/>
+              <a:defRPr sz="2800"/>
+            </a:lvl1pPr>
+            <a:lvl2pPr>
+              <a:buNone/>
+              <a:defRPr sz="2400"/>
+            </a:lvl2pPr>
+            <a:lvl3pPr>
+              <a:buNone/>
+              <a:defRPr sz="2000"/>
+            </a:lvl3pPr>
+            <a:lvl4pPr>
+              <a:buNone/>
+              <a:defRPr sz="1800"/>
+            </a:lvl4pPr>
+            <a:lvl5pPr>
+              <a:buNone/>
+              <a:defRPr sz="1800"/>
+            </a:lvl5pPr>
+            <a:lvl6pPr>
+              <a:defRPr sz="1800"/>
+            </a:lvl6pPr>
+            <a:lvl7pPr>
+              <a:defRPr sz="1800"/>
+            </a:lvl7pPr>
+            <a:lvl8pPr>
+              <a:defRPr sz="1800"/>
+            </a:lvl8pPr>
+            <a:lvl9pPr>
+              <a:defRPr sz="1800"/>
+            </a:lvl9pPr>
+          </a:lstStyle>
+          <a:p>
+            <a:pPr lvl="0"/>
+            <a:r>
+              <a:rPr lang="en-US" dirty="0"/>
+              <a:t>Click to edit Master text styles</a:t>
+            </a:r>
+          </a:p>
+          <a:p>
+            <a:pPr lvl="1"/>
+            <a:r>
+              <a:rPr lang="en-US" dirty="0"/>
+              <a:t>Second level</a:t>
+            </a:r>
+          </a:p>
+          <a:p>
+            <a:pPr lvl="2"/>
+            <a:r>
+              <a:rPr lang="en-US" dirty="0"/>
+              <a:t>Third level</a:t>
+            </a:r>
+          </a:p>
+          <a:p>
+            <a:pPr lvl="3"/>
+            <a:r>
+              <a:rPr lang="en-US" dirty="0"/>
+              <a:t>Fourth level</a:t>
+            </a:r>
+          </a:p>
+          <a:p>
+            <a:pPr lvl="4"/>
+            <a:r>
+              <a:rPr lang="en-US" dirty="0"/>
+              <a:t>Fifth level</a:t>
+            </a:r>
+            <a:endParaRPr lang="en-GB" dirty="0"/>
+          </a:p>
+        </p:txBody>
+      </p:sp>
+      <p:sp>
+        <p:nvSpPr>
+          <p:cNvPr id="5" name="Date Placeholder 4"/>
+          <p:cNvSpPr>
+            <a:spLocks noGrp="1"/>
+          </p:cNvSpPr>
+          <p:nvPr>
+            <p:ph type="dt" sz="half" idx="10"/>
+          </p:nvPr>
+        </p:nvSpPr>
+        <p:spPr>
+          <a:xfrm>
+            <a:off x="251520" y="6356350"/>
+            <a:ext cx="720080" cy="365125"/>
+          </a:xfrm>
+        </p:spPr>
+        <p:txBody>
+          <a:bodyPr/>
+          <a:lstStyle/>
+          <a:p>
+            <a:fld id="{04A76F9C-33B6-4248-95F4-E755A51BE64F}" type="datetime1">
+              <a:rPr lang="en-US" smtClean="0"/>
+              <a:t>12/27/20</a:t>
+            </a:fld>
+            <a:endParaRPr lang="en-GB"/>
+          </a:p>
+        </p:txBody>
+      </p:sp>
+      <p:sp>
+        <p:nvSpPr>
+          <p:cNvPr id="6" name="Footer Placeholder 5"/>
+          <p:cNvSpPr>
+            <a:spLocks noGrp="1"/>
+          </p:cNvSpPr>
+          <p:nvPr>
+            <p:ph type="ftr" sz="quarter" idx="11"/>
+          </p:nvPr>
+        </p:nvSpPr>
+        <p:spPr>
+          <a:xfrm>
+            <a:off x="1043608" y="6356350"/>
+            <a:ext cx="7056784" cy="365125"/>
+          </a:xfrm>
+        </p:spPr>
+        <p:txBody>
+          <a:bodyPr/>
+          <a:lstStyle>
+            <a:lvl1pPr algn="l">
+              <a:defRPr/>
+            </a:lvl1pPr>
+          </a:lstStyle>
+          <a:p>
+            <a:endParaRPr lang="en-GB" dirty="0"/>
+          </a:p>
+        </p:txBody>
+      </p:sp>
+      <p:sp>
+        <p:nvSpPr>
+          <p:cNvPr id="7" name="Slide Number Placeholder 6"/>
+          <p:cNvSpPr>
+            <a:spLocks noGrp="1"/>
+          </p:cNvSpPr>
+          <p:nvPr>
+            <p:ph type="sldNum" sz="quarter" idx="12"/>
+          </p:nvPr>
+        </p:nvSpPr>
+        <p:spPr>
+          <a:xfrm>
+            <a:off x="8172400" y="6356350"/>
+            <a:ext cx="720080" cy="365125"/>
+          </a:xfrm>
+        </p:spPr>
+        <p:txBody>
+          <a:bodyPr/>
+          <a:lstStyle/>
+          <a:p>
+            <a:fld id="{8DADB20D-508E-4C6D-A9E4-257D5607B0F6}" type="slidenum">
+              <a:rPr lang="en-GB" smtClean="0"/>
+              <a:t>‹#›</a:t>
+            </a:fld>
+            <a:endParaRPr lang="en-GB"/>
+          </a:p>
+        </p:txBody>
+      </p:sp>
+      <p:sp>
+        <p:nvSpPr>
+          <p:cNvPr id="10" name="Content Placeholder 10"/>
+          <p:cNvSpPr>
+            <a:spLocks noGrp="1"/>
+          </p:cNvSpPr>
+          <p:nvPr>
+            <p:ph sz="quarter" idx="13"/>
+          </p:nvPr>
+        </p:nvSpPr>
+        <p:spPr>
+          <a:xfrm>
+            <a:off x="251521" y="1038424"/>
+            <a:ext cx="8640960" cy="360362"/>
+          </a:xfrm>
+          <a:prstGeom prst="rect">
+            <a:avLst/>
+          </a:prstGeom>
+        </p:spPr>
+        <p:txBody>
+          <a:bodyPr>
+            <a:noAutofit/>
+          </a:bodyPr>
+          <a:lstStyle>
+            <a:lvl1pPr marL="0" indent="0">
+              <a:buNone/>
+              <a:defRPr sz="2400"/>
+            </a:lvl1pPr>
+            <a:lvl2pPr marL="457200" indent="0">
+              <a:buNone/>
+              <a:defRPr sz="2000"/>
+            </a:lvl2pPr>
+            <a:lvl3pPr marL="914400" indent="0">
+              <a:buNone/>
+              <a:defRPr sz="1800"/>
+            </a:lvl3pPr>
+            <a:lvl4pPr marL="1371600" indent="0">
+              <a:buNone/>
+              <a:defRPr sz="1600"/>
+            </a:lvl4pPr>
+            <a:lvl5pPr marL="1828800" indent="0">
+              <a:buNone/>
+              <a:defRPr sz="1600"/>
+            </a:lvl5pPr>
+          </a:lstStyle>
+          <a:p>
+            <a:pPr lvl="0"/>
+            <a:r>
+              <a:rPr lang="en-US" dirty="0"/>
+              <a:t>Click to edit Master text styles</a:t>
+            </a:r>
+          </a:p>
+          <a:p>
+            <a:pPr lvl="1"/>
+            <a:r>
+              <a:rPr lang="en-US" dirty="0"/>
+              <a:t>Second level</a:t>
+            </a:r>
+          </a:p>
+          <a:p>
+            <a:pPr lvl="2"/>
+            <a:r>
+              <a:rPr lang="en-US" dirty="0"/>
+              <a:t>Third level</a:t>
+            </a:r>
+          </a:p>
+          <a:p>
+            <a:pPr lvl="3"/>
+            <a:r>
+              <a:rPr lang="en-US" dirty="0"/>
+              <a:t>Fourth level</a:t>
+            </a:r>
+          </a:p>
+          <a:p>
+            <a:pPr lvl="4"/>
+            <a:r>
+              <a:rPr lang="en-US" dirty="0"/>
+              <a:t>Fifth level</a:t>
+            </a:r>
+          </a:p>
+        </p:txBody>
+      </p:sp>
+      <p:sp>
+        <p:nvSpPr>
+          <p:cNvPr id="11" name="Text Placeholder 2"/>
+          <p:cNvSpPr>
+            <a:spLocks noGrp="1"/>
+          </p:cNvSpPr>
+          <p:nvPr>
+            <p:ph type="body" idx="14"/>
+          </p:nvPr>
+        </p:nvSpPr>
+        <p:spPr>
+          <a:xfrm>
+            <a:off x="251520" y="1535113"/>
+            <a:ext cx="4245868" cy="639762"/>
+          </a:xfrm>
+          <a:prstGeom prst="rect">
+            <a:avLst/>
+          </a:prstGeom>
+        </p:spPr>
+        <p:txBody>
+          <a:bodyPr anchor="b"/>
+          <a:lstStyle>
+            <a:lvl1pPr marL="0" indent="0">
+              <a:buNone/>
+              <a:defRPr sz="2400" b="1"/>
+            </a:lvl1pPr>
+            <a:lvl2pPr marL="457200" indent="0">
+              <a:buNone/>
+              <a:defRPr sz="2000" b="1"/>
+            </a:lvl2pPr>
+            <a:lvl3pPr marL="914400" indent="0">
+              <a:buNone/>
+              <a:defRPr sz="1800" b="1"/>
+            </a:lvl3pPr>
+            <a:lvl4pPr marL="1371600" indent="0">
+              <a:buNone/>
+              <a:defRPr sz="1600" b="1"/>
+            </a:lvl4pPr>
+            <a:lvl5pPr marL="1828800" indent="0">
+              <a:buNone/>
+              <a:defRPr sz="1600" b="1"/>
+            </a:lvl5pPr>
+            <a:lvl6pPr marL="2286000" indent="0">
+              <a:buNone/>
+              <a:defRPr sz="1600" b="1"/>
+            </a:lvl6pPr>
+            <a:lvl7pPr marL="2743200" indent="0">
+              <a:buNone/>
+              <a:defRPr sz="1600" b="1"/>
+            </a:lvl7pPr>
+            <a:lvl8pPr marL="3200400" indent="0">
+              <a:buNone/>
+              <a:defRPr sz="1600" b="1"/>
+            </a:lvl8pPr>
+            <a:lvl9pPr marL="3657600" indent="0">
+              <a:buNone/>
+              <a:defRPr sz="1600" b="1"/>
+            </a:lvl9pPr>
+          </a:lstStyle>
+          <a:p>
+            <a:pPr lvl="0"/>
+            <a:r>
+              <a:rPr lang="en-US" dirty="0"/>
+              <a:t>Click to edit Master text styles</a:t>
+            </a:r>
+          </a:p>
+        </p:txBody>
+      </p:sp>
+      <p:sp>
+        <p:nvSpPr>
+          <p:cNvPr id="12" name="Text Placeholder 4"/>
+          <p:cNvSpPr>
+            <a:spLocks noGrp="1"/>
+          </p:cNvSpPr>
+          <p:nvPr>
+            <p:ph type="body" sz="quarter" idx="3"/>
+          </p:nvPr>
+        </p:nvSpPr>
+        <p:spPr>
+          <a:xfrm>
+            <a:off x="4645025" y="1535113"/>
+            <a:ext cx="4247455" cy="639762"/>
+          </a:xfrm>
+          <a:prstGeom prst="rect">
+            <a:avLst/>
+          </a:prstGeom>
+        </p:spPr>
+        <p:txBody>
+          <a:bodyPr anchor="b"/>
+          <a:lstStyle>
+            <a:lvl1pPr marL="0" indent="0">
+              <a:buNone/>
+              <a:defRPr sz="2400" b="1"/>
+            </a:lvl1pPr>
+            <a:lvl2pPr marL="457200" indent="0">
+              <a:buNone/>
+              <a:defRPr sz="2000" b="1"/>
+            </a:lvl2pPr>
+            <a:lvl3pPr marL="914400" indent="0">
+              <a:buNone/>
+              <a:defRPr sz="1800" b="1"/>
+            </a:lvl3pPr>
+            <a:lvl4pPr marL="1371600" indent="0">
+              <a:buNone/>
+              <a:defRPr sz="1600" b="1"/>
+            </a:lvl4pPr>
+            <a:lvl5pPr marL="1828800" indent="0">
+              <a:buNone/>
+              <a:defRPr sz="1600" b="1"/>
+            </a:lvl5pPr>
+            <a:lvl6pPr marL="2286000" indent="0">
+              <a:buNone/>
+              <a:defRPr sz="1600" b="1"/>
+            </a:lvl6pPr>
+            <a:lvl7pPr marL="2743200" indent="0">
+              <a:buNone/>
+              <a:defRPr sz="1600" b="1"/>
+            </a:lvl7pPr>
+            <a:lvl8pPr marL="3200400" indent="0">
+              <a:buNone/>
+              <a:defRPr sz="1600" b="1"/>
+            </a:lvl8pPr>
+            <a:lvl9pPr marL="3657600" indent="0">
+              <a:buNone/>
+              <a:defRPr sz="1600" b="1"/>
+            </a:lvl9pPr>
+          </a:lstStyle>
+          <a:p>
+            <a:pPr lvl="0"/>
+            <a:r>
+              <a:rPr lang="en-US" dirty="0"/>
+              <a:t>Click to edit Master text styles</a:t>
+            </a:r>
+          </a:p>
+        </p:txBody>
+      </p:sp>
+    </p:spTree>
+    <p:extLst>
+      <p:ext uri="{BB962C8B-B14F-4D97-AF65-F5344CB8AC3E}">
+        <p14:creationId xmlns:p14="http://schemas.microsoft.com/office/powerpoint/2010/main" val="1184159592"/>
+      </p:ext>
+    </p:extLst>
+  </p:cSld>
+  <p:clrMapOvr>
+    <a:masterClrMapping/>
+  </p:clrMapOvr>
+</p:sldLayout>
+</file>
+
+<file path=ppt/slideLayouts/slideLayout7.xml><?xml version="1.0" encoding="utf-8"?>
+<p:sldLayout xmlns:a="http://schemas.openxmlformats.org/drawingml/2006/main" xmlns:r="http://schemas.openxmlformats.org/officeDocument/2006/relationships" xmlns:p="http://schemas.openxmlformats.org/presentationml/2006/main" preserve="1" userDrawn="1">
+  <p:cSld name="two_content_header_text_backup">
+    <p:spTree>
+      <p:nvGrpSpPr>
+        <p:cNvPr id="1" name=""/>
+        <p:cNvGrpSpPr/>
+        <p:nvPr/>
+      </p:nvGrpSpPr>
+      <p:grpSpPr>
+        <a:xfrm>
+          <a:off x="0" y="0"/>
+          <a:ext cx="0" cy="0"/>
+          <a:chOff x="0" y="0"/>
+          <a:chExt cx="0" cy="0"/>
+        </a:xfrm>
+      </p:grpSpPr>
+      <p:pic>
+        <p:nvPicPr>
+          <p:cNvPr id="8" name="Picture 7" descr="slide_background_tall.png"/>
+          <p:cNvPicPr>
+            <a:picLocks noChangeAspect="1"/>
+          </p:cNvPicPr>
+          <p:nvPr userDrawn="1"/>
+        </p:nvPicPr>
+        <p:blipFill>
+          <a:blip r:embed="rId2">
+            <a:extLst>
+              <a:ext uri="{28A0092B-C50C-407E-A947-70E740481C1C}">
+                <a14:useLocalDpi xmlns:a14="http://schemas.microsoft.com/office/drawing/2010/main" val="0"/>
+              </a:ext>
+            </a:extLst>
+          </a:blip>
+          <a:stretch>
+            <a:fillRect/>
+          </a:stretch>
+        </p:blipFill>
+        <p:spPr>
+          <a:xfrm>
+            <a:off x="0" y="-27384"/>
+            <a:ext cx="9144000" cy="1493881"/>
+          </a:xfrm>
+          <a:prstGeom prst="rect">
+            <a:avLst/>
+          </a:prstGeom>
+        </p:spPr>
+      </p:pic>
+      <p:sp>
+        <p:nvSpPr>
+          <p:cNvPr id="2" name="Title 1"/>
+          <p:cNvSpPr>
+            <a:spLocks noGrp="1"/>
+          </p:cNvSpPr>
+          <p:nvPr>
+            <p:ph type="title"/>
+          </p:nvPr>
+        </p:nvSpPr>
+        <p:spPr>
+          <a:xfrm>
+            <a:off x="251520" y="476672"/>
+            <a:ext cx="8640960" cy="778098"/>
+          </a:xfrm>
+        </p:spPr>
+        <p:txBody>
+          <a:bodyPr/>
+          <a:lstStyle>
+            <a:lvl1pPr>
+              <a:lnSpc>
+                <a:spcPct val="80000"/>
+              </a:lnSpc>
+              <a:defRPr/>
+            </a:lvl1pPr>
+          </a:lstStyle>
+          <a:p>
+            <a:r>
+              <a:rPr lang="en-US" dirty="0"/>
+              <a:t>Click to edit Master title style</a:t>
+            </a:r>
+            <a:endParaRPr lang="en-GB" dirty="0"/>
+          </a:p>
+        </p:txBody>
+      </p:sp>
+      <p:sp>
+        <p:nvSpPr>
+          <p:cNvPr id="3" name="Content Placeholder 2"/>
+          <p:cNvSpPr>
+            <a:spLocks noGrp="1"/>
+          </p:cNvSpPr>
+          <p:nvPr>
+            <p:ph sz="half" idx="1"/>
+          </p:nvPr>
+        </p:nvSpPr>
+        <p:spPr>
+          <a:xfrm>
+            <a:off x="251520" y="2204864"/>
+            <a:ext cx="4244280" cy="4032448"/>
+          </a:xfrm>
+          <a:prstGeom prst="rect">
+            <a:avLst/>
+          </a:prstGeom>
+        </p:spPr>
+        <p:txBody>
           <a:bodyPr>
             <a:normAutofit/>
           </a:bodyPr>
@@ -3126,7 +3883,7 @@
 </p:sldLayout>
 </file>
 
-<file path=ppt/slideLayouts/slideLayout7.xml><?xml version="1.0" encoding="utf-8"?>
+<file path=ppt/slideLayouts/slideLayout8.xml><?xml version="1.0" encoding="utf-8"?>
 <p:sldLayout xmlns:a="http://schemas.openxmlformats.org/drawingml/2006/main" xmlns:r="http://schemas.openxmlformats.org/officeDocument/2006/relationships" xmlns:p="http://schemas.openxmlformats.org/presentationml/2006/main" preserve="1" userDrawn="1">
   <p:cSld name="two_content_list">
     <p:spTree>
@@ -3567,7 +4324,7 @@
 </p:sldLayout>
 </file>
 
-<file path=ppt/slideLayouts/slideLayout8.xml><?xml version="1.0" encoding="utf-8"?>
+<file path=ppt/slideLayouts/slideLayout9.xml><?xml version="1.0" encoding="utf-8"?>
 <p:sldLayout xmlns:a="http://schemas.openxmlformats.org/drawingml/2006/main" xmlns:r="http://schemas.openxmlformats.org/officeDocument/2006/relationships" xmlns:p="http://schemas.openxmlformats.org/presentationml/2006/main" preserve="1" userDrawn="1">
   <p:cSld name="two_content_text">
     <p:spTree>
@@ -4018,180 +4775,6 @@
 </p:sldLayout>
 </file>
 
-<file path=ppt/slideLayouts/slideLayout9.xml><?xml version="1.0" encoding="utf-8"?>
-<p:sldLayout xmlns:a="http://schemas.openxmlformats.org/drawingml/2006/main" xmlns:r="http://schemas.openxmlformats.org/officeDocument/2006/relationships" xmlns:p="http://schemas.openxmlformats.org/presentationml/2006/main" preserve="1" userDrawn="1">
-  <p:cSld name="title_only">
-    <p:spTree>
-      <p:nvGrpSpPr>
-        <p:cNvPr id="1" name=""/>
-        <p:cNvGrpSpPr/>
-        <p:nvPr/>
-      </p:nvGrpSpPr>
-      <p:grpSpPr>
-        <a:xfrm>
-          <a:off x="0" y="0"/>
-          <a:ext cx="0" cy="0"/>
-          <a:chOff x="0" y="0"/>
-          <a:chExt cx="0" cy="0"/>
-        </a:xfrm>
-      </p:grpSpPr>
-      <p:pic>
-        <p:nvPicPr>
-          <p:cNvPr id="6" name="Picture 5" descr="slide_background_tall.png"/>
-          <p:cNvPicPr>
-            <a:picLocks noChangeAspect="1"/>
-          </p:cNvPicPr>
-          <p:nvPr userDrawn="1"/>
-        </p:nvPicPr>
-        <p:blipFill>
-          <a:blip r:embed="rId2">
-            <a:extLst>
-              <a:ext uri="{28A0092B-C50C-407E-A947-70E740481C1C}">
-                <a14:useLocalDpi xmlns:a14="http://schemas.microsoft.com/office/drawing/2010/main" val="0"/>
-              </a:ext>
-            </a:extLst>
-          </a:blip>
-          <a:stretch>
-            <a:fillRect/>
-          </a:stretch>
-        </p:blipFill>
-        <p:spPr>
-          <a:xfrm>
-            <a:off x="0" y="-27384"/>
-            <a:ext cx="9144000" cy="1493881"/>
-          </a:xfrm>
-          <a:prstGeom prst="rect">
-            <a:avLst/>
-          </a:prstGeom>
-        </p:spPr>
-      </p:pic>
-      <p:sp>
-        <p:nvSpPr>
-          <p:cNvPr id="2" name="Title 1"/>
-          <p:cNvSpPr>
-            <a:spLocks noGrp="1"/>
-          </p:cNvSpPr>
-          <p:nvPr>
-            <p:ph type="title"/>
-          </p:nvPr>
-        </p:nvSpPr>
-        <p:spPr/>
-        <p:txBody>
-          <a:bodyPr/>
-          <a:lstStyle>
-            <a:lvl1pPr>
-              <a:lnSpc>
-                <a:spcPct val="80000"/>
-              </a:lnSpc>
-              <a:defRPr/>
-            </a:lvl1pPr>
-          </a:lstStyle>
-          <a:p>
-            <a:r>
-              <a:rPr lang="en-US" dirty="0"/>
-              <a:t>Click to edit Master title style</a:t>
-            </a:r>
-            <a:endParaRPr lang="en-GB" dirty="0"/>
-          </a:p>
-        </p:txBody>
-      </p:sp>
-      <p:sp>
-        <p:nvSpPr>
-          <p:cNvPr id="3" name="Date Placeholder 2"/>
-          <p:cNvSpPr>
-            <a:spLocks noGrp="1"/>
-          </p:cNvSpPr>
-          <p:nvPr>
-            <p:ph type="dt" sz="half" idx="10"/>
-          </p:nvPr>
-        </p:nvSpPr>
-        <p:spPr>
-          <a:xfrm>
-            <a:off x="251520" y="6356350"/>
-            <a:ext cx="720080" cy="365125"/>
-          </a:xfrm>
-        </p:spPr>
-        <p:txBody>
-          <a:bodyPr/>
-          <a:lstStyle/>
-          <a:p>
-            <a:fld id="{D871C1FE-9025-5C49-BA5C-C24D6151D8FF}" type="datetime1">
-              <a:rPr lang="en-US" smtClean="0"/>
-              <a:t>12/27/20</a:t>
-            </a:fld>
-            <a:endParaRPr lang="en-GB"/>
-          </a:p>
-        </p:txBody>
-      </p:sp>
-      <p:sp>
-        <p:nvSpPr>
-          <p:cNvPr id="4" name="Footer Placeholder 3"/>
-          <p:cNvSpPr>
-            <a:spLocks noGrp="1"/>
-          </p:cNvSpPr>
-          <p:nvPr>
-            <p:ph type="ftr" sz="quarter" idx="11"/>
-          </p:nvPr>
-        </p:nvSpPr>
-        <p:spPr>
-          <a:xfrm>
-            <a:off x="1043608" y="6356350"/>
-            <a:ext cx="7056784" cy="365125"/>
-          </a:xfrm>
-        </p:spPr>
-        <p:txBody>
-          <a:bodyPr/>
-          <a:lstStyle>
-            <a:lvl1pPr algn="l">
-              <a:defRPr/>
-            </a:lvl1pPr>
-          </a:lstStyle>
-          <a:p>
-            <a:endParaRPr lang="en-GB" dirty="0"/>
-          </a:p>
-        </p:txBody>
-      </p:sp>
-      <p:sp>
-        <p:nvSpPr>
-          <p:cNvPr id="5" name="Slide Number Placeholder 4"/>
-          <p:cNvSpPr>
-            <a:spLocks noGrp="1"/>
-          </p:cNvSpPr>
-          <p:nvPr>
-            <p:ph type="sldNum" sz="quarter" idx="12"/>
-          </p:nvPr>
-        </p:nvSpPr>
-        <p:spPr>
-          <a:xfrm>
-            <a:off x="8172400" y="6356350"/>
-            <a:ext cx="720080" cy="365125"/>
-          </a:xfrm>
-        </p:spPr>
-        <p:txBody>
-          <a:bodyPr/>
-          <a:lstStyle/>
-          <a:p>
-            <a:fld id="{8DADB20D-508E-4C6D-A9E4-257D5607B0F6}" type="slidenum">
-              <a:rPr lang="en-GB" smtClean="0"/>
-              <a:t>‹#›</a:t>
-            </a:fld>
-            <a:endParaRPr lang="en-GB"/>
-          </a:p>
-        </p:txBody>
-      </p:sp>
-    </p:spTree>
-    <p:extLst>
-      <p:ext uri="{BB962C8B-B14F-4D97-AF65-F5344CB8AC3E}">
-        <p14:creationId xmlns:p14="http://schemas.microsoft.com/office/powerpoint/2010/main" val="1385807973"/>
-      </p:ext>
-    </p:extLst>
-  </p:cSld>
-  <p:clrMapOvr>
-    <a:masterClrMapping/>
-  </p:clrMapOvr>
-</p:sldLayout>
-</file>
-
 <file path=ppt/slideMasters/slideMaster1.xml><?xml version="1.0" encoding="utf-8"?>
 <p:sldMaster xmlns:a="http://schemas.openxmlformats.org/drawingml/2006/main" xmlns:r="http://schemas.openxmlformats.org/officeDocument/2006/relationships" xmlns:p="http://schemas.openxmlformats.org/presentationml/2006/main">
   <p:cSld>
@@ -4442,11 +5025,12 @@
     <p:sldLayoutId id="2147483661" r:id="rId3"/>
     <p:sldLayoutId id="2147483660" r:id="rId4"/>
     <p:sldLayoutId id="2147483652" r:id="rId5"/>
-    <p:sldLayoutId id="2147483658" r:id="rId6"/>
-    <p:sldLayoutId id="2147483657" r:id="rId7"/>
-    <p:sldLayoutId id="2147483659" r:id="rId8"/>
-    <p:sldLayoutId id="2147483654" r:id="rId9"/>
-    <p:sldLayoutId id="2147483655" r:id="rId10"/>
+    <p:sldLayoutId id="2147483662" r:id="rId6"/>
+    <p:sldLayoutId id="2147483658" r:id="rId7"/>
+    <p:sldLayoutId id="2147483657" r:id="rId8"/>
+    <p:sldLayoutId id="2147483659" r:id="rId9"/>
+    <p:sldLayoutId id="2147483654" r:id="rId10"/>
+    <p:sldLayoutId id="2147483655" r:id="rId11"/>
   </p:sldLayoutIdLst>
   <p:hf hdr="0" ftr="0"/>
   <p:txStyles>

</xml_diff>